<commit_message>
Updated presentation ready for preogress report presentation
</commit_message>
<xml_diff>
--- a/RNoahPadilla_FinalProjectProposal.pptx
+++ b/RNoahPadilla_FinalProjectProposal.pptx
@@ -5,13 +5,19 @@
     <p:sldMasterId id="2147483648" r:id="rId1"/>
   </p:sldMasterIdLst>
   <p:notesMasterIdLst>
-    <p:notesMasterId r:id="rId3"/>
+    <p:notesMasterId r:id="rId9"/>
   </p:notesMasterIdLst>
   <p:handoutMasterIdLst>
-    <p:handoutMasterId r:id="rId4"/>
+    <p:handoutMasterId r:id="rId10"/>
   </p:handoutMasterIdLst>
   <p:sldIdLst>
-    <p:sldId id="258" r:id="rId2"/>
+    <p:sldId id="259" r:id="rId2"/>
+    <p:sldId id="258" r:id="rId3"/>
+    <p:sldId id="260" r:id="rId4"/>
+    <p:sldId id="262" r:id="rId5"/>
+    <p:sldId id="263" r:id="rId6"/>
+    <p:sldId id="264" r:id="rId7"/>
+    <p:sldId id="261" r:id="rId8"/>
   </p:sldIdLst>
   <p:sldSz cx="12192000" cy="6858000"/>
   <p:notesSz cx="6858000" cy="9144000"/>
@@ -1612,6 +1618,753 @@
   <dgm:styleLbl name="revTx">
     <dgm:fillClrLst meth="repeat">
       <a:schemeClr val="lt2">
+        <a:alpha val="0"/>
+      </a:schemeClr>
+    </dgm:fillClrLst>
+    <dgm:linClrLst meth="repeat">
+      <a:schemeClr val="dk1">
+        <a:alpha val="0"/>
+      </a:schemeClr>
+    </dgm:linClrLst>
+    <dgm:effectClrLst/>
+    <dgm:txLinClrLst/>
+    <dgm:txFillClrLst meth="repeat">
+      <a:schemeClr val="tx1"/>
+    </dgm:txFillClrLst>
+    <dgm:txEffectClrLst/>
+  </dgm:styleLbl>
+</dgm:colorsDef>
+</file>
+
+<file path=ppt/diagrams/colors3.xml><?xml version="1.0" encoding="utf-8"?>
+<dgm:colorsDef xmlns:dgm="http://schemas.openxmlformats.org/drawingml/2006/diagram" xmlns:a="http://schemas.openxmlformats.org/drawingml/2006/main" uniqueId="urn:microsoft.com/office/officeart/2005/8/colors/accent1_2">
+  <dgm:title val=""/>
+  <dgm:desc val=""/>
+  <dgm:catLst>
+    <dgm:cat type="accent1" pri="11200"/>
+  </dgm:catLst>
+  <dgm:styleLbl name="node0">
+    <dgm:fillClrLst meth="repeat">
+      <a:schemeClr val="accent1"/>
+    </dgm:fillClrLst>
+    <dgm:linClrLst meth="repeat">
+      <a:schemeClr val="lt1"/>
+    </dgm:linClrLst>
+    <dgm:effectClrLst/>
+    <dgm:txLinClrLst/>
+    <dgm:txFillClrLst/>
+    <dgm:txEffectClrLst/>
+  </dgm:styleLbl>
+  <dgm:styleLbl name="alignNode1">
+    <dgm:fillClrLst meth="repeat">
+      <a:schemeClr val="accent1"/>
+    </dgm:fillClrLst>
+    <dgm:linClrLst meth="repeat">
+      <a:schemeClr val="accent1"/>
+    </dgm:linClrLst>
+    <dgm:effectClrLst/>
+    <dgm:txLinClrLst/>
+    <dgm:txFillClrLst/>
+    <dgm:txEffectClrLst/>
+  </dgm:styleLbl>
+  <dgm:styleLbl name="node1">
+    <dgm:fillClrLst meth="repeat">
+      <a:schemeClr val="accent1"/>
+    </dgm:fillClrLst>
+    <dgm:linClrLst meth="repeat">
+      <a:schemeClr val="lt1"/>
+    </dgm:linClrLst>
+    <dgm:effectClrLst/>
+    <dgm:txLinClrLst/>
+    <dgm:txFillClrLst/>
+    <dgm:txEffectClrLst/>
+  </dgm:styleLbl>
+  <dgm:styleLbl name="lnNode1">
+    <dgm:fillClrLst meth="repeat">
+      <a:schemeClr val="accent1"/>
+    </dgm:fillClrLst>
+    <dgm:linClrLst meth="repeat">
+      <a:schemeClr val="lt1"/>
+    </dgm:linClrLst>
+    <dgm:effectClrLst/>
+    <dgm:txLinClrLst/>
+    <dgm:txFillClrLst/>
+    <dgm:txEffectClrLst/>
+  </dgm:styleLbl>
+  <dgm:styleLbl name="vennNode1">
+    <dgm:fillClrLst meth="repeat">
+      <a:schemeClr val="accent1">
+        <a:alpha val="50000"/>
+      </a:schemeClr>
+    </dgm:fillClrLst>
+    <dgm:linClrLst meth="repeat">
+      <a:schemeClr val="lt1"/>
+    </dgm:linClrLst>
+    <dgm:effectClrLst/>
+    <dgm:txLinClrLst/>
+    <dgm:txFillClrLst/>
+    <dgm:txEffectClrLst/>
+  </dgm:styleLbl>
+  <dgm:styleLbl name="node2">
+    <dgm:fillClrLst meth="repeat">
+      <a:schemeClr val="accent1"/>
+    </dgm:fillClrLst>
+    <dgm:linClrLst meth="repeat">
+      <a:schemeClr val="lt1"/>
+    </dgm:linClrLst>
+    <dgm:effectClrLst/>
+    <dgm:txLinClrLst/>
+    <dgm:txFillClrLst/>
+    <dgm:txEffectClrLst/>
+  </dgm:styleLbl>
+  <dgm:styleLbl name="node3">
+    <dgm:fillClrLst meth="repeat">
+      <a:schemeClr val="accent1"/>
+    </dgm:fillClrLst>
+    <dgm:linClrLst meth="repeat">
+      <a:schemeClr val="lt1"/>
+    </dgm:linClrLst>
+    <dgm:effectClrLst/>
+    <dgm:txLinClrLst/>
+    <dgm:txFillClrLst/>
+    <dgm:txEffectClrLst/>
+  </dgm:styleLbl>
+  <dgm:styleLbl name="node4">
+    <dgm:fillClrLst meth="repeat">
+      <a:schemeClr val="accent1"/>
+    </dgm:fillClrLst>
+    <dgm:linClrLst meth="repeat">
+      <a:schemeClr val="lt1"/>
+    </dgm:linClrLst>
+    <dgm:effectClrLst/>
+    <dgm:txLinClrLst/>
+    <dgm:txFillClrLst/>
+    <dgm:txEffectClrLst/>
+  </dgm:styleLbl>
+  <dgm:styleLbl name="fgImgPlace1">
+    <dgm:fillClrLst meth="repeat">
+      <a:schemeClr val="accent1">
+        <a:tint val="50000"/>
+      </a:schemeClr>
+    </dgm:fillClrLst>
+    <dgm:linClrLst meth="repeat">
+      <a:schemeClr val="lt1"/>
+    </dgm:linClrLst>
+    <dgm:effectClrLst/>
+    <dgm:txLinClrLst/>
+    <dgm:txFillClrLst meth="repeat">
+      <a:schemeClr val="lt1"/>
+    </dgm:txFillClrLst>
+    <dgm:txEffectClrLst/>
+  </dgm:styleLbl>
+  <dgm:styleLbl name="alignImgPlace1">
+    <dgm:fillClrLst meth="repeat">
+      <a:schemeClr val="accent1">
+        <a:tint val="50000"/>
+      </a:schemeClr>
+    </dgm:fillClrLst>
+    <dgm:linClrLst meth="repeat">
+      <a:schemeClr val="lt1"/>
+    </dgm:linClrLst>
+    <dgm:effectClrLst/>
+    <dgm:txLinClrLst/>
+    <dgm:txFillClrLst meth="repeat">
+      <a:schemeClr val="lt1"/>
+    </dgm:txFillClrLst>
+    <dgm:txEffectClrLst/>
+  </dgm:styleLbl>
+  <dgm:styleLbl name="bgImgPlace1">
+    <dgm:fillClrLst meth="repeat">
+      <a:schemeClr val="accent1">
+        <a:tint val="50000"/>
+      </a:schemeClr>
+    </dgm:fillClrLst>
+    <dgm:linClrLst meth="repeat">
+      <a:schemeClr val="lt1"/>
+    </dgm:linClrLst>
+    <dgm:effectClrLst/>
+    <dgm:txLinClrLst/>
+    <dgm:txFillClrLst meth="repeat">
+      <a:schemeClr val="lt1"/>
+    </dgm:txFillClrLst>
+    <dgm:txEffectClrLst/>
+  </dgm:styleLbl>
+  <dgm:styleLbl name="sibTrans2D1">
+    <dgm:fillClrLst meth="repeat">
+      <a:schemeClr val="accent1">
+        <a:tint val="60000"/>
+      </a:schemeClr>
+    </dgm:fillClrLst>
+    <dgm:linClrLst meth="repeat">
+      <a:schemeClr val="accent1">
+        <a:tint val="60000"/>
+      </a:schemeClr>
+    </dgm:linClrLst>
+    <dgm:effectClrLst/>
+    <dgm:txLinClrLst/>
+    <dgm:txFillClrLst/>
+    <dgm:txEffectClrLst/>
+  </dgm:styleLbl>
+  <dgm:styleLbl name="fgSibTrans2D1">
+    <dgm:fillClrLst meth="repeat">
+      <a:schemeClr val="accent1">
+        <a:tint val="60000"/>
+      </a:schemeClr>
+    </dgm:fillClrLst>
+    <dgm:linClrLst meth="repeat">
+      <a:schemeClr val="accent1">
+        <a:tint val="60000"/>
+      </a:schemeClr>
+    </dgm:linClrLst>
+    <dgm:effectClrLst/>
+    <dgm:txLinClrLst/>
+    <dgm:txFillClrLst/>
+    <dgm:txEffectClrLst/>
+  </dgm:styleLbl>
+  <dgm:styleLbl name="bgSibTrans2D1">
+    <dgm:fillClrLst meth="repeat">
+      <a:schemeClr val="accent1">
+        <a:tint val="60000"/>
+      </a:schemeClr>
+    </dgm:fillClrLst>
+    <dgm:linClrLst meth="repeat">
+      <a:schemeClr val="accent1">
+        <a:tint val="60000"/>
+      </a:schemeClr>
+    </dgm:linClrLst>
+    <dgm:effectClrLst/>
+    <dgm:txLinClrLst/>
+    <dgm:txFillClrLst/>
+    <dgm:txEffectClrLst/>
+  </dgm:styleLbl>
+  <dgm:styleLbl name="sibTrans1D1">
+    <dgm:fillClrLst meth="repeat">
+      <a:schemeClr val="accent1"/>
+    </dgm:fillClrLst>
+    <dgm:linClrLst meth="repeat">
+      <a:schemeClr val="accent1"/>
+    </dgm:linClrLst>
+    <dgm:effectClrLst/>
+    <dgm:txLinClrLst/>
+    <dgm:txFillClrLst meth="repeat">
+      <a:schemeClr val="tx1"/>
+    </dgm:txFillClrLst>
+    <dgm:txEffectClrLst/>
+  </dgm:styleLbl>
+  <dgm:styleLbl name="callout">
+    <dgm:fillClrLst meth="repeat">
+      <a:schemeClr val="accent1"/>
+    </dgm:fillClrLst>
+    <dgm:linClrLst meth="repeat">
+      <a:schemeClr val="accent1">
+        <a:tint val="50000"/>
+      </a:schemeClr>
+    </dgm:linClrLst>
+    <dgm:effectClrLst/>
+    <dgm:txLinClrLst/>
+    <dgm:txFillClrLst meth="repeat">
+      <a:schemeClr val="tx1"/>
+    </dgm:txFillClrLst>
+    <dgm:txEffectClrLst/>
+  </dgm:styleLbl>
+  <dgm:styleLbl name="asst0">
+    <dgm:fillClrLst meth="repeat">
+      <a:schemeClr val="accent1"/>
+    </dgm:fillClrLst>
+    <dgm:linClrLst meth="repeat">
+      <a:schemeClr val="lt1"/>
+    </dgm:linClrLst>
+    <dgm:effectClrLst/>
+    <dgm:txLinClrLst/>
+    <dgm:txFillClrLst/>
+    <dgm:txEffectClrLst/>
+  </dgm:styleLbl>
+  <dgm:styleLbl name="asst1">
+    <dgm:fillClrLst meth="repeat">
+      <a:schemeClr val="accent1"/>
+    </dgm:fillClrLst>
+    <dgm:linClrLst meth="repeat">
+      <a:schemeClr val="lt1"/>
+    </dgm:linClrLst>
+    <dgm:effectClrLst/>
+    <dgm:txLinClrLst/>
+    <dgm:txFillClrLst/>
+    <dgm:txEffectClrLst/>
+  </dgm:styleLbl>
+  <dgm:styleLbl name="asst2">
+    <dgm:fillClrLst meth="repeat">
+      <a:schemeClr val="accent1"/>
+    </dgm:fillClrLst>
+    <dgm:linClrLst meth="repeat">
+      <a:schemeClr val="lt1"/>
+    </dgm:linClrLst>
+    <dgm:effectClrLst/>
+    <dgm:txLinClrLst/>
+    <dgm:txFillClrLst/>
+    <dgm:txEffectClrLst/>
+  </dgm:styleLbl>
+  <dgm:styleLbl name="asst3">
+    <dgm:fillClrLst meth="repeat">
+      <a:schemeClr val="accent1"/>
+    </dgm:fillClrLst>
+    <dgm:linClrLst meth="repeat">
+      <a:schemeClr val="lt1"/>
+    </dgm:linClrLst>
+    <dgm:effectClrLst/>
+    <dgm:txLinClrLst/>
+    <dgm:txFillClrLst/>
+    <dgm:txEffectClrLst/>
+  </dgm:styleLbl>
+  <dgm:styleLbl name="asst4">
+    <dgm:fillClrLst meth="repeat">
+      <a:schemeClr val="accent1"/>
+    </dgm:fillClrLst>
+    <dgm:linClrLst meth="repeat">
+      <a:schemeClr val="lt1"/>
+    </dgm:linClrLst>
+    <dgm:effectClrLst/>
+    <dgm:txLinClrLst/>
+    <dgm:txFillClrLst/>
+    <dgm:txEffectClrLst/>
+  </dgm:styleLbl>
+  <dgm:styleLbl name="parChTrans2D1">
+    <dgm:fillClrLst meth="repeat">
+      <a:schemeClr val="accent1">
+        <a:tint val="60000"/>
+      </a:schemeClr>
+    </dgm:fillClrLst>
+    <dgm:linClrLst meth="repeat">
+      <a:schemeClr val="accent1">
+        <a:tint val="60000"/>
+      </a:schemeClr>
+    </dgm:linClrLst>
+    <dgm:effectClrLst/>
+    <dgm:txLinClrLst/>
+    <dgm:txFillClrLst meth="repeat">
+      <a:schemeClr val="lt1"/>
+    </dgm:txFillClrLst>
+    <dgm:txEffectClrLst/>
+  </dgm:styleLbl>
+  <dgm:styleLbl name="parChTrans2D2">
+    <dgm:fillClrLst meth="repeat">
+      <a:schemeClr val="accent1"/>
+    </dgm:fillClrLst>
+    <dgm:linClrLst meth="repeat">
+      <a:schemeClr val="accent1"/>
+    </dgm:linClrLst>
+    <dgm:effectClrLst/>
+    <dgm:txLinClrLst/>
+    <dgm:txFillClrLst meth="repeat">
+      <a:schemeClr val="lt1"/>
+    </dgm:txFillClrLst>
+    <dgm:txEffectClrLst/>
+  </dgm:styleLbl>
+  <dgm:styleLbl name="parChTrans2D3">
+    <dgm:fillClrLst meth="repeat">
+      <a:schemeClr val="accent1"/>
+    </dgm:fillClrLst>
+    <dgm:linClrLst meth="repeat">
+      <a:schemeClr val="accent1"/>
+    </dgm:linClrLst>
+    <dgm:effectClrLst/>
+    <dgm:txLinClrLst/>
+    <dgm:txFillClrLst meth="repeat">
+      <a:schemeClr val="lt1"/>
+    </dgm:txFillClrLst>
+    <dgm:txEffectClrLst/>
+  </dgm:styleLbl>
+  <dgm:styleLbl name="parChTrans2D4">
+    <dgm:fillClrLst meth="repeat">
+      <a:schemeClr val="accent1"/>
+    </dgm:fillClrLst>
+    <dgm:linClrLst meth="repeat">
+      <a:schemeClr val="accent1"/>
+    </dgm:linClrLst>
+    <dgm:effectClrLst/>
+    <dgm:txLinClrLst/>
+    <dgm:txFillClrLst meth="repeat">
+      <a:schemeClr val="lt1"/>
+    </dgm:txFillClrLst>
+    <dgm:txEffectClrLst/>
+  </dgm:styleLbl>
+  <dgm:styleLbl name="parChTrans1D1">
+    <dgm:fillClrLst meth="repeat">
+      <a:schemeClr val="accent1"/>
+    </dgm:fillClrLst>
+    <dgm:linClrLst meth="repeat">
+      <a:schemeClr val="accent1">
+        <a:shade val="60000"/>
+      </a:schemeClr>
+    </dgm:linClrLst>
+    <dgm:effectClrLst/>
+    <dgm:txLinClrLst/>
+    <dgm:txFillClrLst meth="repeat">
+      <a:schemeClr val="tx1"/>
+    </dgm:txFillClrLst>
+    <dgm:txEffectClrLst/>
+  </dgm:styleLbl>
+  <dgm:styleLbl name="parChTrans1D2">
+    <dgm:fillClrLst meth="repeat">
+      <a:schemeClr val="accent1"/>
+    </dgm:fillClrLst>
+    <dgm:linClrLst meth="repeat">
+      <a:schemeClr val="accent1">
+        <a:shade val="60000"/>
+      </a:schemeClr>
+    </dgm:linClrLst>
+    <dgm:effectClrLst/>
+    <dgm:txLinClrLst/>
+    <dgm:txFillClrLst meth="repeat">
+      <a:schemeClr val="tx1"/>
+    </dgm:txFillClrLst>
+    <dgm:txEffectClrLst/>
+  </dgm:styleLbl>
+  <dgm:styleLbl name="parChTrans1D3">
+    <dgm:fillClrLst meth="repeat">
+      <a:schemeClr val="accent1"/>
+    </dgm:fillClrLst>
+    <dgm:linClrLst meth="repeat">
+      <a:schemeClr val="accent1">
+        <a:shade val="80000"/>
+      </a:schemeClr>
+    </dgm:linClrLst>
+    <dgm:effectClrLst/>
+    <dgm:txLinClrLst/>
+    <dgm:txFillClrLst meth="repeat">
+      <a:schemeClr val="tx1"/>
+    </dgm:txFillClrLst>
+    <dgm:txEffectClrLst/>
+  </dgm:styleLbl>
+  <dgm:styleLbl name="parChTrans1D4">
+    <dgm:fillClrLst meth="repeat">
+      <a:schemeClr val="accent1"/>
+    </dgm:fillClrLst>
+    <dgm:linClrLst meth="repeat">
+      <a:schemeClr val="accent1">
+        <a:shade val="80000"/>
+      </a:schemeClr>
+    </dgm:linClrLst>
+    <dgm:effectClrLst/>
+    <dgm:txLinClrLst/>
+    <dgm:txFillClrLst meth="repeat">
+      <a:schemeClr val="tx1"/>
+    </dgm:txFillClrLst>
+    <dgm:txEffectClrLst/>
+  </dgm:styleLbl>
+  <dgm:styleLbl name="fgAcc1">
+    <dgm:fillClrLst meth="repeat">
+      <a:schemeClr val="lt1">
+        <a:alpha val="90000"/>
+      </a:schemeClr>
+    </dgm:fillClrLst>
+    <dgm:linClrLst meth="repeat">
+      <a:schemeClr val="accent1"/>
+    </dgm:linClrLst>
+    <dgm:effectClrLst/>
+    <dgm:txLinClrLst/>
+    <dgm:txFillClrLst meth="repeat">
+      <a:schemeClr val="dk1"/>
+    </dgm:txFillClrLst>
+    <dgm:txEffectClrLst/>
+  </dgm:styleLbl>
+  <dgm:styleLbl name="conFgAcc1">
+    <dgm:fillClrLst meth="repeat">
+      <a:schemeClr val="lt1">
+        <a:alpha val="90000"/>
+      </a:schemeClr>
+    </dgm:fillClrLst>
+    <dgm:linClrLst meth="repeat">
+      <a:schemeClr val="accent1"/>
+    </dgm:linClrLst>
+    <dgm:effectClrLst/>
+    <dgm:txLinClrLst/>
+    <dgm:txFillClrLst meth="repeat">
+      <a:schemeClr val="dk1"/>
+    </dgm:txFillClrLst>
+    <dgm:txEffectClrLst/>
+  </dgm:styleLbl>
+  <dgm:styleLbl name="alignAcc1">
+    <dgm:fillClrLst meth="repeat">
+      <a:schemeClr val="lt1">
+        <a:alpha val="90000"/>
+      </a:schemeClr>
+    </dgm:fillClrLst>
+    <dgm:linClrLst meth="repeat">
+      <a:schemeClr val="accent1"/>
+    </dgm:linClrLst>
+    <dgm:effectClrLst/>
+    <dgm:txLinClrLst/>
+    <dgm:txFillClrLst meth="repeat">
+      <a:schemeClr val="dk1"/>
+    </dgm:txFillClrLst>
+    <dgm:txEffectClrLst/>
+  </dgm:styleLbl>
+  <dgm:styleLbl name="trAlignAcc1">
+    <dgm:fillClrLst meth="repeat">
+      <a:schemeClr val="lt1">
+        <a:alpha val="40000"/>
+      </a:schemeClr>
+    </dgm:fillClrLst>
+    <dgm:linClrLst meth="repeat">
+      <a:schemeClr val="accent1"/>
+    </dgm:linClrLst>
+    <dgm:effectClrLst/>
+    <dgm:txLinClrLst/>
+    <dgm:txFillClrLst meth="repeat">
+      <a:schemeClr val="dk1"/>
+    </dgm:txFillClrLst>
+    <dgm:txEffectClrLst/>
+  </dgm:styleLbl>
+  <dgm:styleLbl name="bgAcc1">
+    <dgm:fillClrLst meth="repeat">
+      <a:schemeClr val="lt1">
+        <a:alpha val="90000"/>
+      </a:schemeClr>
+    </dgm:fillClrLst>
+    <dgm:linClrLst meth="repeat">
+      <a:schemeClr val="accent1"/>
+    </dgm:linClrLst>
+    <dgm:effectClrLst/>
+    <dgm:txLinClrLst/>
+    <dgm:txFillClrLst meth="repeat">
+      <a:schemeClr val="dk1"/>
+    </dgm:txFillClrLst>
+    <dgm:txEffectClrLst/>
+  </dgm:styleLbl>
+  <dgm:styleLbl name="solidFgAcc1">
+    <dgm:fillClrLst meth="repeat">
+      <a:schemeClr val="lt1"/>
+    </dgm:fillClrLst>
+    <dgm:linClrLst meth="repeat">
+      <a:schemeClr val="accent1"/>
+    </dgm:linClrLst>
+    <dgm:effectClrLst/>
+    <dgm:txLinClrLst/>
+    <dgm:txFillClrLst meth="repeat">
+      <a:schemeClr val="dk1"/>
+    </dgm:txFillClrLst>
+    <dgm:txEffectClrLst/>
+  </dgm:styleLbl>
+  <dgm:styleLbl name="solidAlignAcc1">
+    <dgm:fillClrLst meth="repeat">
+      <a:schemeClr val="lt1"/>
+    </dgm:fillClrLst>
+    <dgm:linClrLst meth="repeat">
+      <a:schemeClr val="accent1"/>
+    </dgm:linClrLst>
+    <dgm:effectClrLst/>
+    <dgm:txLinClrLst/>
+    <dgm:txFillClrLst meth="repeat">
+      <a:schemeClr val="dk1"/>
+    </dgm:txFillClrLst>
+    <dgm:txEffectClrLst/>
+  </dgm:styleLbl>
+  <dgm:styleLbl name="solidBgAcc1">
+    <dgm:fillClrLst meth="repeat">
+      <a:schemeClr val="lt1"/>
+    </dgm:fillClrLst>
+    <dgm:linClrLst meth="repeat">
+      <a:schemeClr val="accent1"/>
+    </dgm:linClrLst>
+    <dgm:effectClrLst/>
+    <dgm:txLinClrLst/>
+    <dgm:txFillClrLst meth="repeat">
+      <a:schemeClr val="dk1"/>
+    </dgm:txFillClrLst>
+    <dgm:txEffectClrLst/>
+  </dgm:styleLbl>
+  <dgm:styleLbl name="fgAccFollowNode1">
+    <dgm:fillClrLst meth="repeat">
+      <a:schemeClr val="accent1">
+        <a:alpha val="90000"/>
+        <a:tint val="40000"/>
+      </a:schemeClr>
+    </dgm:fillClrLst>
+    <dgm:linClrLst meth="repeat">
+      <a:schemeClr val="accent1">
+        <a:alpha val="90000"/>
+        <a:tint val="40000"/>
+      </a:schemeClr>
+    </dgm:linClrLst>
+    <dgm:effectClrLst/>
+    <dgm:txLinClrLst/>
+    <dgm:txFillClrLst meth="repeat">
+      <a:schemeClr val="dk1"/>
+    </dgm:txFillClrLst>
+    <dgm:txEffectClrLst/>
+  </dgm:styleLbl>
+  <dgm:styleLbl name="alignAccFollowNode1">
+    <dgm:fillClrLst meth="repeat">
+      <a:schemeClr val="accent1">
+        <a:alpha val="90000"/>
+        <a:tint val="40000"/>
+      </a:schemeClr>
+    </dgm:fillClrLst>
+    <dgm:linClrLst meth="repeat">
+      <a:schemeClr val="accent1">
+        <a:alpha val="90000"/>
+        <a:tint val="40000"/>
+      </a:schemeClr>
+    </dgm:linClrLst>
+    <dgm:effectClrLst/>
+    <dgm:txLinClrLst/>
+    <dgm:txFillClrLst meth="repeat">
+      <a:schemeClr val="dk1"/>
+    </dgm:txFillClrLst>
+    <dgm:txEffectClrLst/>
+  </dgm:styleLbl>
+  <dgm:styleLbl name="bgAccFollowNode1">
+    <dgm:fillClrLst meth="repeat">
+      <a:schemeClr val="accent1">
+        <a:alpha val="90000"/>
+        <a:tint val="40000"/>
+      </a:schemeClr>
+    </dgm:fillClrLst>
+    <dgm:linClrLst meth="repeat">
+      <a:schemeClr val="accent1">
+        <a:alpha val="90000"/>
+        <a:tint val="40000"/>
+      </a:schemeClr>
+    </dgm:linClrLst>
+    <dgm:effectClrLst/>
+    <dgm:txLinClrLst/>
+    <dgm:txFillClrLst meth="repeat">
+      <a:schemeClr val="dk1"/>
+    </dgm:txFillClrLst>
+    <dgm:txEffectClrLst/>
+  </dgm:styleLbl>
+  <dgm:styleLbl name="fgAcc0">
+    <dgm:fillClrLst meth="repeat">
+      <a:schemeClr val="lt1">
+        <a:alpha val="90000"/>
+      </a:schemeClr>
+    </dgm:fillClrLst>
+    <dgm:linClrLst meth="repeat">
+      <a:schemeClr val="accent1"/>
+    </dgm:linClrLst>
+    <dgm:effectClrLst/>
+    <dgm:txLinClrLst/>
+    <dgm:txFillClrLst meth="repeat">
+      <a:schemeClr val="dk1"/>
+    </dgm:txFillClrLst>
+    <dgm:txEffectClrLst/>
+  </dgm:styleLbl>
+  <dgm:styleLbl name="fgAcc2">
+    <dgm:fillClrLst meth="repeat">
+      <a:schemeClr val="lt1">
+        <a:alpha val="90000"/>
+      </a:schemeClr>
+    </dgm:fillClrLst>
+    <dgm:linClrLst meth="repeat">
+      <a:schemeClr val="accent1"/>
+    </dgm:linClrLst>
+    <dgm:effectClrLst/>
+    <dgm:txLinClrLst/>
+    <dgm:txFillClrLst meth="repeat">
+      <a:schemeClr val="dk1"/>
+    </dgm:txFillClrLst>
+    <dgm:txEffectClrLst/>
+  </dgm:styleLbl>
+  <dgm:styleLbl name="fgAcc3">
+    <dgm:fillClrLst meth="repeat">
+      <a:schemeClr val="lt1">
+        <a:alpha val="90000"/>
+      </a:schemeClr>
+    </dgm:fillClrLst>
+    <dgm:linClrLst meth="repeat">
+      <a:schemeClr val="accent1"/>
+    </dgm:linClrLst>
+    <dgm:effectClrLst/>
+    <dgm:txLinClrLst/>
+    <dgm:txFillClrLst meth="repeat">
+      <a:schemeClr val="dk1"/>
+    </dgm:txFillClrLst>
+    <dgm:txEffectClrLst/>
+  </dgm:styleLbl>
+  <dgm:styleLbl name="fgAcc4">
+    <dgm:fillClrLst meth="repeat">
+      <a:schemeClr val="lt1">
+        <a:alpha val="90000"/>
+      </a:schemeClr>
+    </dgm:fillClrLst>
+    <dgm:linClrLst meth="repeat">
+      <a:schemeClr val="accent1"/>
+    </dgm:linClrLst>
+    <dgm:effectClrLst/>
+    <dgm:txLinClrLst/>
+    <dgm:txFillClrLst meth="repeat">
+      <a:schemeClr val="dk1"/>
+    </dgm:txFillClrLst>
+    <dgm:txEffectClrLst/>
+  </dgm:styleLbl>
+  <dgm:styleLbl name="bgShp">
+    <dgm:fillClrLst meth="repeat">
+      <a:schemeClr val="accent1">
+        <a:tint val="40000"/>
+      </a:schemeClr>
+    </dgm:fillClrLst>
+    <dgm:linClrLst meth="repeat">
+      <a:schemeClr val="accent1"/>
+    </dgm:linClrLst>
+    <dgm:effectClrLst/>
+    <dgm:txLinClrLst/>
+    <dgm:txFillClrLst meth="repeat">
+      <a:schemeClr val="dk1"/>
+    </dgm:txFillClrLst>
+    <dgm:txEffectClrLst/>
+  </dgm:styleLbl>
+  <dgm:styleLbl name="dkBgShp">
+    <dgm:fillClrLst meth="repeat">
+      <a:schemeClr val="accent1">
+        <a:shade val="80000"/>
+      </a:schemeClr>
+    </dgm:fillClrLst>
+    <dgm:linClrLst meth="repeat">
+      <a:schemeClr val="accent1"/>
+    </dgm:linClrLst>
+    <dgm:effectClrLst/>
+    <dgm:txLinClrLst/>
+    <dgm:txFillClrLst meth="repeat">
+      <a:schemeClr val="lt1"/>
+    </dgm:txFillClrLst>
+    <dgm:txEffectClrLst/>
+  </dgm:styleLbl>
+  <dgm:styleLbl name="trBgShp">
+    <dgm:fillClrLst meth="repeat">
+      <a:schemeClr val="accent1">
+        <a:tint val="50000"/>
+        <a:alpha val="40000"/>
+      </a:schemeClr>
+    </dgm:fillClrLst>
+    <dgm:linClrLst meth="repeat">
+      <a:schemeClr val="accent1"/>
+    </dgm:linClrLst>
+    <dgm:effectClrLst/>
+    <dgm:txLinClrLst/>
+    <dgm:txFillClrLst meth="repeat">
+      <a:schemeClr val="lt1"/>
+    </dgm:txFillClrLst>
+    <dgm:txEffectClrLst/>
+  </dgm:styleLbl>
+  <dgm:styleLbl name="fgShp">
+    <dgm:fillClrLst meth="repeat">
+      <a:schemeClr val="accent1">
+        <a:tint val="60000"/>
+      </a:schemeClr>
+    </dgm:fillClrLst>
+    <dgm:linClrLst meth="repeat">
+      <a:schemeClr val="lt1"/>
+    </dgm:linClrLst>
+    <dgm:effectClrLst/>
+    <dgm:txLinClrLst/>
+    <dgm:txFillClrLst meth="repeat">
+      <a:schemeClr val="dk1"/>
+    </dgm:txFillClrLst>
+    <dgm:txEffectClrLst/>
+  </dgm:styleLbl>
+  <dgm:styleLbl name="revTx">
+    <dgm:fillClrLst meth="repeat">
+      <a:schemeClr val="lt1">
         <a:alpha val="0"/>
       </a:schemeClr>
     </dgm:fillClrLst>
@@ -1835,7 +2588,15 @@
         <a:p>
           <a:r>
             <a:rPr lang="en-US" dirty="0"/>
-            <a:t>Extract data and filter it (CHOG) from STANFORD car dataset (</a:t>
+            <a:t>Extract data and filter </a:t>
+          </a:r>
+          <a:r>
+            <a:rPr lang="en-US"/>
+            <a:t>it (HOG) </a:t>
+          </a:r>
+          <a:r>
+            <a:rPr lang="en-US" dirty="0"/>
+            <a:t>from STANFORD car dataset (</a:t>
           </a:r>
           <a:r>
             <a:rPr lang="en-US" b="0" i="0" dirty="0"/>
@@ -2167,6 +2928,255 @@
   <dgm:extLst>
     <a:ext uri="http://schemas.microsoft.com/office/drawing/2008/diagram">
       <dsp:dataModelExt xmlns:dsp="http://schemas.microsoft.com/office/drawing/2008/diagram" relId="rId11" minVer="http://schemas.openxmlformats.org/drawingml/2006/diagram"/>
+    </a:ext>
+  </dgm:extLst>
+</dgm:dataModel>
+</file>
+
+<file path=ppt/diagrams/data3.xml><?xml version="1.0" encoding="utf-8"?>
+<dgm:dataModel xmlns:dgm="http://schemas.openxmlformats.org/drawingml/2006/diagram" xmlns:a="http://schemas.openxmlformats.org/drawingml/2006/main">
+  <dgm:ptLst>
+    <dgm:pt modelId="{8665BBF4-ED4F-4CBE-8EDC-F2BC1915829A}" type="doc">
+      <dgm:prSet loTypeId="urn:microsoft.com/office/officeart/2005/8/layout/hProcess11" loCatId="process" qsTypeId="urn:microsoft.com/office/officeart/2005/8/quickstyle/simple1" qsCatId="simple" csTypeId="urn:microsoft.com/office/officeart/2005/8/colors/accent1_2" csCatId="accent1" phldr="1"/>
+      <dgm:spPr/>
+    </dgm:pt>
+    <dgm:pt modelId="{0A5B2DA1-A08D-4ADE-9B5D-A4D11C883345}">
+      <dgm:prSet phldrT="[Text]"/>
+      <dgm:spPr/>
+      <dgm:t>
+        <a:bodyPr/>
+        <a:lstStyle/>
+        <a:p>
+          <a:r>
+            <a:rPr lang="en-US" dirty="0">
+              <a:solidFill>
+                <a:schemeClr val="accent1"/>
+              </a:solidFill>
+            </a:rPr>
+            <a:t>Filter data</a:t>
+          </a:r>
+        </a:p>
+      </dgm:t>
+    </dgm:pt>
+    <dgm:pt modelId="{3117E56E-3EA6-474D-8AA3-CDCD9D6EB36C}" type="parTrans" cxnId="{4301802E-D21E-470C-8331-45368CBF0825}">
+      <dgm:prSet/>
+      <dgm:spPr/>
+      <dgm:t>
+        <a:bodyPr/>
+        <a:lstStyle/>
+        <a:p>
+          <a:endParaRPr lang="en-US"/>
+        </a:p>
+      </dgm:t>
+    </dgm:pt>
+    <dgm:pt modelId="{01DECA5F-2999-49A5-8E81-C6C68B3A0547}" type="sibTrans" cxnId="{4301802E-D21E-470C-8331-45368CBF0825}">
+      <dgm:prSet/>
+      <dgm:spPr/>
+      <dgm:t>
+        <a:bodyPr/>
+        <a:lstStyle/>
+        <a:p>
+          <a:endParaRPr lang="en-US"/>
+        </a:p>
+      </dgm:t>
+    </dgm:pt>
+    <dgm:pt modelId="{E80F3850-5136-45AE-B8A9-37DDDD2A38EC}">
+      <dgm:prSet phldrT="[Text]"/>
+      <dgm:spPr/>
+      <dgm:t>
+        <a:bodyPr/>
+        <a:lstStyle/>
+        <a:p>
+          <a:r>
+            <a:rPr lang="en-US" dirty="0">
+              <a:solidFill>
+                <a:schemeClr val="accent1"/>
+              </a:solidFill>
+            </a:rPr>
+            <a:t>Cluster using HOG</a:t>
+          </a:r>
+          <a:endParaRPr lang="en-US" dirty="0"/>
+        </a:p>
+      </dgm:t>
+    </dgm:pt>
+    <dgm:pt modelId="{345FA546-B412-46CB-8C5E-61B87C1EF046}" type="parTrans" cxnId="{A6A31A28-CFB6-4E38-9FFD-BAB51B8AE3A9}">
+      <dgm:prSet/>
+      <dgm:spPr/>
+      <dgm:t>
+        <a:bodyPr/>
+        <a:lstStyle/>
+        <a:p>
+          <a:endParaRPr lang="en-US"/>
+        </a:p>
+      </dgm:t>
+    </dgm:pt>
+    <dgm:pt modelId="{C4F44090-3435-441A-95F8-313551B76219}" type="sibTrans" cxnId="{A6A31A28-CFB6-4E38-9FFD-BAB51B8AE3A9}">
+      <dgm:prSet/>
+      <dgm:spPr/>
+      <dgm:t>
+        <a:bodyPr/>
+        <a:lstStyle/>
+        <a:p>
+          <a:endParaRPr lang="en-US"/>
+        </a:p>
+      </dgm:t>
+    </dgm:pt>
+    <dgm:pt modelId="{24B9A1B4-68CE-4B92-9485-455C40E6E77E}">
+      <dgm:prSet phldrT="[Text]"/>
+      <dgm:spPr/>
+      <dgm:t>
+        <a:bodyPr/>
+        <a:lstStyle/>
+        <a:p>
+          <a:r>
+            <a:rPr lang="en-US" dirty="0">
+              <a:solidFill>
+                <a:schemeClr val="accent1"/>
+              </a:solidFill>
+            </a:rPr>
+            <a:t>ORB+RANSAC</a:t>
+          </a:r>
+        </a:p>
+      </dgm:t>
+    </dgm:pt>
+    <dgm:pt modelId="{4AE2E963-7A57-41D3-9F17-E83983155C90}" type="parTrans" cxnId="{5B991AEB-DB81-4AC6-B40C-4FD53236EC7C}">
+      <dgm:prSet/>
+      <dgm:spPr/>
+      <dgm:t>
+        <a:bodyPr/>
+        <a:lstStyle/>
+        <a:p>
+          <a:endParaRPr lang="en-US"/>
+        </a:p>
+      </dgm:t>
+    </dgm:pt>
+    <dgm:pt modelId="{6E9C788C-EFD2-4912-89E5-CBDFEE2DE68E}" type="sibTrans" cxnId="{5B991AEB-DB81-4AC6-B40C-4FD53236EC7C}">
+      <dgm:prSet/>
+      <dgm:spPr/>
+      <dgm:t>
+        <a:bodyPr/>
+        <a:lstStyle/>
+        <a:p>
+          <a:endParaRPr lang="en-US"/>
+        </a:p>
+      </dgm:t>
+    </dgm:pt>
+    <dgm:pt modelId="{97DF088F-BC04-41C2-BB0C-85BCA22ECD10}" type="pres">
+      <dgm:prSet presAssocID="{8665BBF4-ED4F-4CBE-8EDC-F2BC1915829A}" presName="Name0" presStyleCnt="0">
+        <dgm:presLayoutVars>
+          <dgm:dir/>
+          <dgm:resizeHandles val="exact"/>
+        </dgm:presLayoutVars>
+      </dgm:prSet>
+      <dgm:spPr/>
+    </dgm:pt>
+    <dgm:pt modelId="{A6A49EBB-CFC0-4A47-A342-62721EDFA0E7}" type="pres">
+      <dgm:prSet presAssocID="{8665BBF4-ED4F-4CBE-8EDC-F2BC1915829A}" presName="arrow" presStyleLbl="bgShp" presStyleIdx="0" presStyleCnt="1"/>
+      <dgm:spPr/>
+    </dgm:pt>
+    <dgm:pt modelId="{A99DBA48-01EB-4D5B-BA30-6905352AD21A}" type="pres">
+      <dgm:prSet presAssocID="{8665BBF4-ED4F-4CBE-8EDC-F2BC1915829A}" presName="points" presStyleCnt="0"/>
+      <dgm:spPr/>
+    </dgm:pt>
+    <dgm:pt modelId="{B002DD66-29B5-4CC2-9E34-8769E0C1D4D0}" type="pres">
+      <dgm:prSet presAssocID="{0A5B2DA1-A08D-4ADE-9B5D-A4D11C883345}" presName="compositeA" presStyleCnt="0"/>
+      <dgm:spPr/>
+    </dgm:pt>
+    <dgm:pt modelId="{632E9BC8-89AC-474D-A073-ECBE68863EA5}" type="pres">
+      <dgm:prSet presAssocID="{0A5B2DA1-A08D-4ADE-9B5D-A4D11C883345}" presName="textA" presStyleLbl="revTx" presStyleIdx="0" presStyleCnt="3">
+        <dgm:presLayoutVars>
+          <dgm:bulletEnabled val="1"/>
+        </dgm:presLayoutVars>
+      </dgm:prSet>
+      <dgm:spPr/>
+    </dgm:pt>
+    <dgm:pt modelId="{87B0411B-AF56-4C6A-8088-AF5BF88E0861}" type="pres">
+      <dgm:prSet presAssocID="{0A5B2DA1-A08D-4ADE-9B5D-A4D11C883345}" presName="circleA" presStyleLbl="node1" presStyleIdx="0" presStyleCnt="3"/>
+      <dgm:spPr/>
+    </dgm:pt>
+    <dgm:pt modelId="{E1EC8A11-A163-40FE-A878-AC1A43C64C16}" type="pres">
+      <dgm:prSet presAssocID="{0A5B2DA1-A08D-4ADE-9B5D-A4D11C883345}" presName="spaceA" presStyleCnt="0"/>
+      <dgm:spPr/>
+    </dgm:pt>
+    <dgm:pt modelId="{3AF81BD1-006B-4259-83B6-408301A37137}" type="pres">
+      <dgm:prSet presAssocID="{01DECA5F-2999-49A5-8E81-C6C68B3A0547}" presName="space" presStyleCnt="0"/>
+      <dgm:spPr/>
+    </dgm:pt>
+    <dgm:pt modelId="{E8028692-5586-4559-B400-9CDF7916E98A}" type="pres">
+      <dgm:prSet presAssocID="{E80F3850-5136-45AE-B8A9-37DDDD2A38EC}" presName="compositeB" presStyleCnt="0"/>
+      <dgm:spPr/>
+    </dgm:pt>
+    <dgm:pt modelId="{B5647545-39C2-41D8-97AE-1335D11F8F0F}" type="pres">
+      <dgm:prSet presAssocID="{E80F3850-5136-45AE-B8A9-37DDDD2A38EC}" presName="textB" presStyleLbl="revTx" presStyleIdx="1" presStyleCnt="3">
+        <dgm:presLayoutVars>
+          <dgm:bulletEnabled val="1"/>
+        </dgm:presLayoutVars>
+      </dgm:prSet>
+      <dgm:spPr/>
+    </dgm:pt>
+    <dgm:pt modelId="{A1005736-731E-496F-8CAA-25E7AB18096D}" type="pres">
+      <dgm:prSet presAssocID="{E80F3850-5136-45AE-B8A9-37DDDD2A38EC}" presName="circleB" presStyleLbl="node1" presStyleIdx="1" presStyleCnt="3"/>
+      <dgm:spPr/>
+    </dgm:pt>
+    <dgm:pt modelId="{A59804F3-59A5-4536-8295-806A986AF0D2}" type="pres">
+      <dgm:prSet presAssocID="{E80F3850-5136-45AE-B8A9-37DDDD2A38EC}" presName="spaceB" presStyleCnt="0"/>
+      <dgm:spPr/>
+    </dgm:pt>
+    <dgm:pt modelId="{9D26AE23-F131-4E7A-BA46-E3C13617163C}" type="pres">
+      <dgm:prSet presAssocID="{C4F44090-3435-441A-95F8-313551B76219}" presName="space" presStyleCnt="0"/>
+      <dgm:spPr/>
+    </dgm:pt>
+    <dgm:pt modelId="{1250DC43-7C72-403A-B219-FF20B7E42820}" type="pres">
+      <dgm:prSet presAssocID="{24B9A1B4-68CE-4B92-9485-455C40E6E77E}" presName="compositeA" presStyleCnt="0"/>
+      <dgm:spPr/>
+    </dgm:pt>
+    <dgm:pt modelId="{24F7137D-1E65-4EBA-BDC4-AC82EB0D5BF9}" type="pres">
+      <dgm:prSet presAssocID="{24B9A1B4-68CE-4B92-9485-455C40E6E77E}" presName="textA" presStyleLbl="revTx" presStyleIdx="2" presStyleCnt="3">
+        <dgm:presLayoutVars>
+          <dgm:bulletEnabled val="1"/>
+        </dgm:presLayoutVars>
+      </dgm:prSet>
+      <dgm:spPr/>
+    </dgm:pt>
+    <dgm:pt modelId="{80667F9A-66A0-4EA4-BD71-D1754E4EE518}" type="pres">
+      <dgm:prSet presAssocID="{24B9A1B4-68CE-4B92-9485-455C40E6E77E}" presName="circleA" presStyleLbl="node1" presStyleIdx="2" presStyleCnt="3"/>
+      <dgm:spPr/>
+    </dgm:pt>
+    <dgm:pt modelId="{041284FB-46E3-4974-9E83-15A19BA46E82}" type="pres">
+      <dgm:prSet presAssocID="{24B9A1B4-68CE-4B92-9485-455C40E6E77E}" presName="spaceA" presStyleCnt="0"/>
+      <dgm:spPr/>
+    </dgm:pt>
+  </dgm:ptLst>
+  <dgm:cxnLst>
+    <dgm:cxn modelId="{A6A31A28-CFB6-4E38-9FFD-BAB51B8AE3A9}" srcId="{8665BBF4-ED4F-4CBE-8EDC-F2BC1915829A}" destId="{E80F3850-5136-45AE-B8A9-37DDDD2A38EC}" srcOrd="1" destOrd="0" parTransId="{345FA546-B412-46CB-8C5E-61B87C1EF046}" sibTransId="{C4F44090-3435-441A-95F8-313551B76219}"/>
+    <dgm:cxn modelId="{4301802E-D21E-470C-8331-45368CBF0825}" srcId="{8665BBF4-ED4F-4CBE-8EDC-F2BC1915829A}" destId="{0A5B2DA1-A08D-4ADE-9B5D-A4D11C883345}" srcOrd="0" destOrd="0" parTransId="{3117E56E-3EA6-474D-8AA3-CDCD9D6EB36C}" sibTransId="{01DECA5F-2999-49A5-8E81-C6C68B3A0547}"/>
+    <dgm:cxn modelId="{FFB13E79-22BD-4D3A-A5CB-91560BDE4917}" type="presOf" srcId="{8665BBF4-ED4F-4CBE-8EDC-F2BC1915829A}" destId="{97DF088F-BC04-41C2-BB0C-85BCA22ECD10}" srcOrd="0" destOrd="0" presId="urn:microsoft.com/office/officeart/2005/8/layout/hProcess11"/>
+    <dgm:cxn modelId="{9BC886B5-2D41-4515-8125-23D23958549E}" type="presOf" srcId="{0A5B2DA1-A08D-4ADE-9B5D-A4D11C883345}" destId="{632E9BC8-89AC-474D-A073-ECBE68863EA5}" srcOrd="0" destOrd="0" presId="urn:microsoft.com/office/officeart/2005/8/layout/hProcess11"/>
+    <dgm:cxn modelId="{67ECF4E3-3502-4C42-BD06-1E2C8E4180DF}" type="presOf" srcId="{24B9A1B4-68CE-4B92-9485-455C40E6E77E}" destId="{24F7137D-1E65-4EBA-BDC4-AC82EB0D5BF9}" srcOrd="0" destOrd="0" presId="urn:microsoft.com/office/officeart/2005/8/layout/hProcess11"/>
+    <dgm:cxn modelId="{5B991AEB-DB81-4AC6-B40C-4FD53236EC7C}" srcId="{8665BBF4-ED4F-4CBE-8EDC-F2BC1915829A}" destId="{24B9A1B4-68CE-4B92-9485-455C40E6E77E}" srcOrd="2" destOrd="0" parTransId="{4AE2E963-7A57-41D3-9F17-E83983155C90}" sibTransId="{6E9C788C-EFD2-4912-89E5-CBDFEE2DE68E}"/>
+    <dgm:cxn modelId="{C51D56F4-E213-45DA-BF8A-35B7752AE23B}" type="presOf" srcId="{E80F3850-5136-45AE-B8A9-37DDDD2A38EC}" destId="{B5647545-39C2-41D8-97AE-1335D11F8F0F}" srcOrd="0" destOrd="0" presId="urn:microsoft.com/office/officeart/2005/8/layout/hProcess11"/>
+    <dgm:cxn modelId="{93D5B14B-0C81-4A28-A4FE-1B738F78C597}" type="presParOf" srcId="{97DF088F-BC04-41C2-BB0C-85BCA22ECD10}" destId="{A6A49EBB-CFC0-4A47-A342-62721EDFA0E7}" srcOrd="0" destOrd="0" presId="urn:microsoft.com/office/officeart/2005/8/layout/hProcess11"/>
+    <dgm:cxn modelId="{4A64E517-C5D3-45FC-BE4E-327F610B8009}" type="presParOf" srcId="{97DF088F-BC04-41C2-BB0C-85BCA22ECD10}" destId="{A99DBA48-01EB-4D5B-BA30-6905352AD21A}" srcOrd="1" destOrd="0" presId="urn:microsoft.com/office/officeart/2005/8/layout/hProcess11"/>
+    <dgm:cxn modelId="{D63DD483-C461-4D52-8D46-4C442F5F2C86}" type="presParOf" srcId="{A99DBA48-01EB-4D5B-BA30-6905352AD21A}" destId="{B002DD66-29B5-4CC2-9E34-8769E0C1D4D0}" srcOrd="0" destOrd="0" presId="urn:microsoft.com/office/officeart/2005/8/layout/hProcess11"/>
+    <dgm:cxn modelId="{3DA36D52-7842-4036-B3F1-C921AD9F6D2C}" type="presParOf" srcId="{B002DD66-29B5-4CC2-9E34-8769E0C1D4D0}" destId="{632E9BC8-89AC-474D-A073-ECBE68863EA5}" srcOrd="0" destOrd="0" presId="urn:microsoft.com/office/officeart/2005/8/layout/hProcess11"/>
+    <dgm:cxn modelId="{56A68737-4345-4112-B480-0DC2A0626518}" type="presParOf" srcId="{B002DD66-29B5-4CC2-9E34-8769E0C1D4D0}" destId="{87B0411B-AF56-4C6A-8088-AF5BF88E0861}" srcOrd="1" destOrd="0" presId="urn:microsoft.com/office/officeart/2005/8/layout/hProcess11"/>
+    <dgm:cxn modelId="{6FF21D2D-9B9A-4F4B-A61A-024686FC6D34}" type="presParOf" srcId="{B002DD66-29B5-4CC2-9E34-8769E0C1D4D0}" destId="{E1EC8A11-A163-40FE-A878-AC1A43C64C16}" srcOrd="2" destOrd="0" presId="urn:microsoft.com/office/officeart/2005/8/layout/hProcess11"/>
+    <dgm:cxn modelId="{F606E8D8-7358-4EEB-A06C-8AA62C86A576}" type="presParOf" srcId="{A99DBA48-01EB-4D5B-BA30-6905352AD21A}" destId="{3AF81BD1-006B-4259-83B6-408301A37137}" srcOrd="1" destOrd="0" presId="urn:microsoft.com/office/officeart/2005/8/layout/hProcess11"/>
+    <dgm:cxn modelId="{72D04CCE-14B8-418A-ACCE-6DCB0D08863B}" type="presParOf" srcId="{A99DBA48-01EB-4D5B-BA30-6905352AD21A}" destId="{E8028692-5586-4559-B400-9CDF7916E98A}" srcOrd="2" destOrd="0" presId="urn:microsoft.com/office/officeart/2005/8/layout/hProcess11"/>
+    <dgm:cxn modelId="{51BC5F3D-9935-4940-86C7-CF5CAD9F1A20}" type="presParOf" srcId="{E8028692-5586-4559-B400-9CDF7916E98A}" destId="{B5647545-39C2-41D8-97AE-1335D11F8F0F}" srcOrd="0" destOrd="0" presId="urn:microsoft.com/office/officeart/2005/8/layout/hProcess11"/>
+    <dgm:cxn modelId="{F1C55FE2-20AB-4631-960E-8865B84D4EB1}" type="presParOf" srcId="{E8028692-5586-4559-B400-9CDF7916E98A}" destId="{A1005736-731E-496F-8CAA-25E7AB18096D}" srcOrd="1" destOrd="0" presId="urn:microsoft.com/office/officeart/2005/8/layout/hProcess11"/>
+    <dgm:cxn modelId="{64592E8A-66A0-4B48-900F-BC3819A440AF}" type="presParOf" srcId="{E8028692-5586-4559-B400-9CDF7916E98A}" destId="{A59804F3-59A5-4536-8295-806A986AF0D2}" srcOrd="2" destOrd="0" presId="urn:microsoft.com/office/officeart/2005/8/layout/hProcess11"/>
+    <dgm:cxn modelId="{5031FDBD-6389-4E39-B029-5095DB75C289}" type="presParOf" srcId="{A99DBA48-01EB-4D5B-BA30-6905352AD21A}" destId="{9D26AE23-F131-4E7A-BA46-E3C13617163C}" srcOrd="3" destOrd="0" presId="urn:microsoft.com/office/officeart/2005/8/layout/hProcess11"/>
+    <dgm:cxn modelId="{22F4CE07-4949-41E9-868A-5375639E6D31}" type="presParOf" srcId="{A99DBA48-01EB-4D5B-BA30-6905352AD21A}" destId="{1250DC43-7C72-403A-B219-FF20B7E42820}" srcOrd="4" destOrd="0" presId="urn:microsoft.com/office/officeart/2005/8/layout/hProcess11"/>
+    <dgm:cxn modelId="{E3724F07-AFE4-47A6-9AE3-1C3E5DE9352E}" type="presParOf" srcId="{1250DC43-7C72-403A-B219-FF20B7E42820}" destId="{24F7137D-1E65-4EBA-BDC4-AC82EB0D5BF9}" srcOrd="0" destOrd="0" presId="urn:microsoft.com/office/officeart/2005/8/layout/hProcess11"/>
+    <dgm:cxn modelId="{C9563438-451B-477B-9790-F5F71166957E}" type="presParOf" srcId="{1250DC43-7C72-403A-B219-FF20B7E42820}" destId="{80667F9A-66A0-4EA4-BD71-D1754E4EE518}" srcOrd="1" destOrd="0" presId="urn:microsoft.com/office/officeart/2005/8/layout/hProcess11"/>
+    <dgm:cxn modelId="{AEE3BBD6-721A-4F2C-8450-9DCE560EC824}" type="presParOf" srcId="{1250DC43-7C72-403A-B219-FF20B7E42820}" destId="{041284FB-46E3-4974-9E83-15A19BA46E82}" srcOrd="2" destOrd="0" presId="urn:microsoft.com/office/officeart/2005/8/layout/hProcess11"/>
+  </dgm:cxnLst>
+  <dgm:bg/>
+  <dgm:whole/>
+  <dgm:extLst>
+    <a:ext uri="http://schemas.microsoft.com/office/drawing/2008/diagram">
+      <dsp:dataModelExt xmlns:dsp="http://schemas.microsoft.com/office/drawing/2008/diagram" relId="rId6" minVer="http://schemas.openxmlformats.org/drawingml/2006/diagram"/>
     </a:ext>
   </dgm:extLst>
 </dgm:dataModel>
@@ -2640,7 +3650,15 @@
           </a:pPr>
           <a:r>
             <a:rPr lang="en-US" sz="1500" kern="1200" dirty="0"/>
-            <a:t>Extract data and filter it (CHOG) from STANFORD car dataset (</a:t>
+            <a:t>Extract data and filter </a:t>
+          </a:r>
+          <a:r>
+            <a:rPr lang="en-US" sz="1500" kern="1200"/>
+            <a:t>it (HOG) </a:t>
+          </a:r>
+          <a:r>
+            <a:rPr lang="en-US" sz="1500" kern="1200" dirty="0"/>
+            <a:t>from STANFORD car dataset (</a:t>
           </a:r>
           <a:r>
             <a:rPr lang="en-US" sz="1500" b="0" i="0" kern="1200" dirty="0"/>
@@ -3225,6 +4243,401 @@
         <a:off x="6429700" y="1196914"/>
         <a:ext cx="1710512" cy="1601358"/>
       </dsp:txXfrm>
+    </dsp:sp>
+  </dsp:spTree>
+</dsp:drawing>
+</file>
+
+<file path=ppt/diagrams/drawing3.xml><?xml version="1.0" encoding="utf-8"?>
+<dsp:drawing xmlns:dgm="http://schemas.openxmlformats.org/drawingml/2006/diagram" xmlns:dsp="http://schemas.microsoft.com/office/drawing/2008/diagram" xmlns:a="http://schemas.openxmlformats.org/drawingml/2006/main">
+  <dsp:spTree>
+    <dsp:nvGrpSpPr>
+      <dsp:cNvPr id="0" name=""/>
+      <dsp:cNvGrpSpPr/>
+    </dsp:nvGrpSpPr>
+    <dsp:grpSpPr/>
+    <dsp:sp modelId="{A6A49EBB-CFC0-4A47-A342-62721EDFA0E7}">
+      <dsp:nvSpPr>
+        <dsp:cNvPr id="0" name=""/>
+        <dsp:cNvSpPr/>
+      </dsp:nvSpPr>
+      <dsp:spPr>
+        <a:xfrm>
+          <a:off x="0" y="771367"/>
+          <a:ext cx="11903978" cy="1028490"/>
+        </a:xfrm>
+        <a:prstGeom prst="notchedRightArrow">
+          <a:avLst/>
+        </a:prstGeom>
+        <a:solidFill>
+          <a:schemeClr val="accent1">
+            <a:tint val="40000"/>
+            <a:hueOff val="0"/>
+            <a:satOff val="0"/>
+            <a:lumOff val="0"/>
+            <a:alphaOff val="0"/>
+          </a:schemeClr>
+        </a:solidFill>
+        <a:ln>
+          <a:noFill/>
+        </a:ln>
+        <a:effectLst/>
+      </dsp:spPr>
+      <dsp:style>
+        <a:lnRef idx="0">
+          <a:scrgbClr r="0" g="0" b="0"/>
+        </a:lnRef>
+        <a:fillRef idx="1">
+          <a:scrgbClr r="0" g="0" b="0"/>
+        </a:fillRef>
+        <a:effectRef idx="0">
+          <a:scrgbClr r="0" g="0" b="0"/>
+        </a:effectRef>
+        <a:fontRef idx="minor"/>
+      </dsp:style>
+    </dsp:sp>
+    <dsp:sp modelId="{632E9BC8-89AC-474D-A073-ECBE68863EA5}">
+      <dsp:nvSpPr>
+        <dsp:cNvPr id="0" name=""/>
+        <dsp:cNvSpPr/>
+      </dsp:nvSpPr>
+      <dsp:spPr>
+        <a:xfrm>
+          <a:off x="5231" y="0"/>
+          <a:ext cx="3452618" cy="1028490"/>
+        </a:xfrm>
+        <a:prstGeom prst="rect">
+          <a:avLst/>
+        </a:prstGeom>
+        <a:noFill/>
+        <a:ln>
+          <a:noFill/>
+        </a:ln>
+        <a:effectLst/>
+      </dsp:spPr>
+      <dsp:style>
+        <a:lnRef idx="0">
+          <a:scrgbClr r="0" g="0" b="0"/>
+        </a:lnRef>
+        <a:fillRef idx="0">
+          <a:scrgbClr r="0" g="0" b="0"/>
+        </a:fillRef>
+        <a:effectRef idx="0">
+          <a:scrgbClr r="0" g="0" b="0"/>
+        </a:effectRef>
+        <a:fontRef idx="minor"/>
+      </dsp:style>
+      <dsp:txBody>
+        <a:bodyPr spcFirstLastPara="0" vert="horz" wrap="square" lIns="199136" tIns="199136" rIns="199136" bIns="199136" numCol="1" spcCol="1270" anchor="b" anchorCtr="0">
+          <a:noAutofit/>
+        </a:bodyPr>
+        <a:lstStyle/>
+        <a:p>
+          <a:pPr marL="0" lvl="0" indent="0" algn="ctr" defTabSz="1244600">
+            <a:lnSpc>
+              <a:spcPct val="90000"/>
+            </a:lnSpc>
+            <a:spcBef>
+              <a:spcPct val="0"/>
+            </a:spcBef>
+            <a:spcAft>
+              <a:spcPct val="35000"/>
+            </a:spcAft>
+            <a:buNone/>
+          </a:pPr>
+          <a:r>
+            <a:rPr lang="en-US" sz="2800" kern="1200" dirty="0">
+              <a:solidFill>
+                <a:schemeClr val="accent1"/>
+              </a:solidFill>
+            </a:rPr>
+            <a:t>Filter data</a:t>
+          </a:r>
+        </a:p>
+      </dsp:txBody>
+      <dsp:txXfrm>
+        <a:off x="5231" y="0"/>
+        <a:ext cx="3452618" cy="1028490"/>
+      </dsp:txXfrm>
+    </dsp:sp>
+    <dsp:sp modelId="{87B0411B-AF56-4C6A-8088-AF5BF88E0861}">
+      <dsp:nvSpPr>
+        <dsp:cNvPr id="0" name=""/>
+        <dsp:cNvSpPr/>
+      </dsp:nvSpPr>
+      <dsp:spPr>
+        <a:xfrm>
+          <a:off x="1602979" y="1157051"/>
+          <a:ext cx="257122" cy="257122"/>
+        </a:xfrm>
+        <a:prstGeom prst="ellipse">
+          <a:avLst/>
+        </a:prstGeom>
+        <a:solidFill>
+          <a:schemeClr val="accent1">
+            <a:hueOff val="0"/>
+            <a:satOff val="0"/>
+            <a:lumOff val="0"/>
+            <a:alphaOff val="0"/>
+          </a:schemeClr>
+        </a:solidFill>
+        <a:ln w="12700" cap="flat" cmpd="sng" algn="ctr">
+          <a:solidFill>
+            <a:schemeClr val="lt1">
+              <a:hueOff val="0"/>
+              <a:satOff val="0"/>
+              <a:lumOff val="0"/>
+              <a:alphaOff val="0"/>
+            </a:schemeClr>
+          </a:solidFill>
+          <a:prstDash val="solid"/>
+          <a:miter lim="800000"/>
+        </a:ln>
+        <a:effectLst/>
+      </dsp:spPr>
+      <dsp:style>
+        <a:lnRef idx="2">
+          <a:scrgbClr r="0" g="0" b="0"/>
+        </a:lnRef>
+        <a:fillRef idx="1">
+          <a:scrgbClr r="0" g="0" b="0"/>
+        </a:fillRef>
+        <a:effectRef idx="0">
+          <a:scrgbClr r="0" g="0" b="0"/>
+        </a:effectRef>
+        <a:fontRef idx="minor">
+          <a:schemeClr val="lt1"/>
+        </a:fontRef>
+      </dsp:style>
+    </dsp:sp>
+    <dsp:sp modelId="{B5647545-39C2-41D8-97AE-1335D11F8F0F}">
+      <dsp:nvSpPr>
+        <dsp:cNvPr id="0" name=""/>
+        <dsp:cNvSpPr/>
+      </dsp:nvSpPr>
+      <dsp:spPr>
+        <a:xfrm>
+          <a:off x="3630480" y="1542735"/>
+          <a:ext cx="3452618" cy="1028490"/>
+        </a:xfrm>
+        <a:prstGeom prst="rect">
+          <a:avLst/>
+        </a:prstGeom>
+        <a:noFill/>
+        <a:ln>
+          <a:noFill/>
+        </a:ln>
+        <a:effectLst/>
+      </dsp:spPr>
+      <dsp:style>
+        <a:lnRef idx="0">
+          <a:scrgbClr r="0" g="0" b="0"/>
+        </a:lnRef>
+        <a:fillRef idx="0">
+          <a:scrgbClr r="0" g="0" b="0"/>
+        </a:fillRef>
+        <a:effectRef idx="0">
+          <a:scrgbClr r="0" g="0" b="0"/>
+        </a:effectRef>
+        <a:fontRef idx="minor"/>
+      </dsp:style>
+      <dsp:txBody>
+        <a:bodyPr spcFirstLastPara="0" vert="horz" wrap="square" lIns="199136" tIns="199136" rIns="199136" bIns="199136" numCol="1" spcCol="1270" anchor="t" anchorCtr="0">
+          <a:noAutofit/>
+        </a:bodyPr>
+        <a:lstStyle/>
+        <a:p>
+          <a:pPr marL="0" lvl="0" indent="0" algn="ctr" defTabSz="1244600">
+            <a:lnSpc>
+              <a:spcPct val="90000"/>
+            </a:lnSpc>
+            <a:spcBef>
+              <a:spcPct val="0"/>
+            </a:spcBef>
+            <a:spcAft>
+              <a:spcPct val="35000"/>
+            </a:spcAft>
+            <a:buNone/>
+          </a:pPr>
+          <a:r>
+            <a:rPr lang="en-US" sz="2800" kern="1200" dirty="0">
+              <a:solidFill>
+                <a:schemeClr val="accent1"/>
+              </a:solidFill>
+            </a:rPr>
+            <a:t>Cluster using HOG</a:t>
+          </a:r>
+          <a:endParaRPr lang="en-US" sz="2800" kern="1200" dirty="0"/>
+        </a:p>
+      </dsp:txBody>
+      <dsp:txXfrm>
+        <a:off x="3630480" y="1542735"/>
+        <a:ext cx="3452618" cy="1028490"/>
+      </dsp:txXfrm>
+    </dsp:sp>
+    <dsp:sp modelId="{A1005736-731E-496F-8CAA-25E7AB18096D}">
+      <dsp:nvSpPr>
+        <dsp:cNvPr id="0" name=""/>
+        <dsp:cNvSpPr/>
+      </dsp:nvSpPr>
+      <dsp:spPr>
+        <a:xfrm>
+          <a:off x="5228228" y="1157051"/>
+          <a:ext cx="257122" cy="257122"/>
+        </a:xfrm>
+        <a:prstGeom prst="ellipse">
+          <a:avLst/>
+        </a:prstGeom>
+        <a:solidFill>
+          <a:schemeClr val="accent1">
+            <a:hueOff val="0"/>
+            <a:satOff val="0"/>
+            <a:lumOff val="0"/>
+            <a:alphaOff val="0"/>
+          </a:schemeClr>
+        </a:solidFill>
+        <a:ln w="12700" cap="flat" cmpd="sng" algn="ctr">
+          <a:solidFill>
+            <a:schemeClr val="lt1">
+              <a:hueOff val="0"/>
+              <a:satOff val="0"/>
+              <a:lumOff val="0"/>
+              <a:alphaOff val="0"/>
+            </a:schemeClr>
+          </a:solidFill>
+          <a:prstDash val="solid"/>
+          <a:miter lim="800000"/>
+        </a:ln>
+        <a:effectLst/>
+      </dsp:spPr>
+      <dsp:style>
+        <a:lnRef idx="2">
+          <a:scrgbClr r="0" g="0" b="0"/>
+        </a:lnRef>
+        <a:fillRef idx="1">
+          <a:scrgbClr r="0" g="0" b="0"/>
+        </a:fillRef>
+        <a:effectRef idx="0">
+          <a:scrgbClr r="0" g="0" b="0"/>
+        </a:effectRef>
+        <a:fontRef idx="minor">
+          <a:schemeClr val="lt1"/>
+        </a:fontRef>
+      </dsp:style>
+    </dsp:sp>
+    <dsp:sp modelId="{24F7137D-1E65-4EBA-BDC4-AC82EB0D5BF9}">
+      <dsp:nvSpPr>
+        <dsp:cNvPr id="0" name=""/>
+        <dsp:cNvSpPr/>
+      </dsp:nvSpPr>
+      <dsp:spPr>
+        <a:xfrm>
+          <a:off x="7255730" y="0"/>
+          <a:ext cx="3452618" cy="1028490"/>
+        </a:xfrm>
+        <a:prstGeom prst="rect">
+          <a:avLst/>
+        </a:prstGeom>
+        <a:noFill/>
+        <a:ln>
+          <a:noFill/>
+        </a:ln>
+        <a:effectLst/>
+      </dsp:spPr>
+      <dsp:style>
+        <a:lnRef idx="0">
+          <a:scrgbClr r="0" g="0" b="0"/>
+        </a:lnRef>
+        <a:fillRef idx="0">
+          <a:scrgbClr r="0" g="0" b="0"/>
+        </a:fillRef>
+        <a:effectRef idx="0">
+          <a:scrgbClr r="0" g="0" b="0"/>
+        </a:effectRef>
+        <a:fontRef idx="minor"/>
+      </dsp:style>
+      <dsp:txBody>
+        <a:bodyPr spcFirstLastPara="0" vert="horz" wrap="square" lIns="199136" tIns="199136" rIns="199136" bIns="199136" numCol="1" spcCol="1270" anchor="b" anchorCtr="0">
+          <a:noAutofit/>
+        </a:bodyPr>
+        <a:lstStyle/>
+        <a:p>
+          <a:pPr marL="0" lvl="0" indent="0" algn="ctr" defTabSz="1244600">
+            <a:lnSpc>
+              <a:spcPct val="90000"/>
+            </a:lnSpc>
+            <a:spcBef>
+              <a:spcPct val="0"/>
+            </a:spcBef>
+            <a:spcAft>
+              <a:spcPct val="35000"/>
+            </a:spcAft>
+            <a:buNone/>
+          </a:pPr>
+          <a:r>
+            <a:rPr lang="en-US" sz="2800" kern="1200" dirty="0">
+              <a:solidFill>
+                <a:schemeClr val="accent1"/>
+              </a:solidFill>
+            </a:rPr>
+            <a:t>ORB+RANSAC</a:t>
+          </a:r>
+        </a:p>
+      </dsp:txBody>
+      <dsp:txXfrm>
+        <a:off x="7255730" y="0"/>
+        <a:ext cx="3452618" cy="1028490"/>
+      </dsp:txXfrm>
+    </dsp:sp>
+    <dsp:sp modelId="{80667F9A-66A0-4EA4-BD71-D1754E4EE518}">
+      <dsp:nvSpPr>
+        <dsp:cNvPr id="0" name=""/>
+        <dsp:cNvSpPr/>
+      </dsp:nvSpPr>
+      <dsp:spPr>
+        <a:xfrm>
+          <a:off x="8853478" y="1157051"/>
+          <a:ext cx="257122" cy="257122"/>
+        </a:xfrm>
+        <a:prstGeom prst="ellipse">
+          <a:avLst/>
+        </a:prstGeom>
+        <a:solidFill>
+          <a:schemeClr val="accent1">
+            <a:hueOff val="0"/>
+            <a:satOff val="0"/>
+            <a:lumOff val="0"/>
+            <a:alphaOff val="0"/>
+          </a:schemeClr>
+        </a:solidFill>
+        <a:ln w="12700" cap="flat" cmpd="sng" algn="ctr">
+          <a:solidFill>
+            <a:schemeClr val="lt1">
+              <a:hueOff val="0"/>
+              <a:satOff val="0"/>
+              <a:lumOff val="0"/>
+              <a:alphaOff val="0"/>
+            </a:schemeClr>
+          </a:solidFill>
+          <a:prstDash val="solid"/>
+          <a:miter lim="800000"/>
+        </a:ln>
+        <a:effectLst/>
+      </dsp:spPr>
+      <dsp:style>
+        <a:lnRef idx="2">
+          <a:scrgbClr r="0" g="0" b="0"/>
+        </a:lnRef>
+        <a:fillRef idx="1">
+          <a:scrgbClr r="0" g="0" b="0"/>
+        </a:fillRef>
+        <a:effectRef idx="0">
+          <a:scrgbClr r="0" g="0" b="0"/>
+        </a:effectRef>
+        <a:fontRef idx="minor">
+          <a:schemeClr val="lt1"/>
+        </a:fontRef>
+      </dsp:style>
     </dsp:sp>
   </dsp:spTree>
 </dsp:drawing>
@@ -3849,6 +5262,278 @@
 </dgm:layoutDef>
 </file>
 
+<file path=ppt/diagrams/layout3.xml><?xml version="1.0" encoding="utf-8"?>
+<dgm:layoutDef xmlns:dgm="http://schemas.openxmlformats.org/drawingml/2006/diagram" xmlns:a="http://schemas.openxmlformats.org/drawingml/2006/main" uniqueId="urn:microsoft.com/office/officeart/2005/8/layout/hProcess11">
+  <dgm:title val=""/>
+  <dgm:desc val=""/>
+  <dgm:catLst>
+    <dgm:cat type="process" pri="8000"/>
+    <dgm:cat type="convert" pri="14000"/>
+  </dgm:catLst>
+  <dgm:sampData useDef="1">
+    <dgm:dataModel>
+      <dgm:ptLst/>
+      <dgm:bg/>
+      <dgm:whole/>
+    </dgm:dataModel>
+  </dgm:sampData>
+  <dgm:styleData>
+    <dgm:dataModel>
+      <dgm:ptLst>
+        <dgm:pt modelId="0" type="doc"/>
+        <dgm:pt modelId="1"/>
+        <dgm:pt modelId="2"/>
+      </dgm:ptLst>
+      <dgm:cxnLst>
+        <dgm:cxn modelId="4" srcId="0" destId="1" srcOrd="0" destOrd="0"/>
+        <dgm:cxn modelId="5" srcId="0" destId="2" srcOrd="1" destOrd="0"/>
+      </dgm:cxnLst>
+      <dgm:bg/>
+      <dgm:whole/>
+    </dgm:dataModel>
+  </dgm:styleData>
+  <dgm:clrData>
+    <dgm:dataModel>
+      <dgm:ptLst>
+        <dgm:pt modelId="0" type="doc"/>
+        <dgm:pt modelId="1"/>
+        <dgm:pt modelId="2"/>
+        <dgm:pt modelId="3"/>
+        <dgm:pt modelId="4"/>
+      </dgm:ptLst>
+      <dgm:cxnLst>
+        <dgm:cxn modelId="5" srcId="0" destId="1" srcOrd="0" destOrd="0"/>
+        <dgm:cxn modelId="6" srcId="0" destId="2" srcOrd="1" destOrd="0"/>
+        <dgm:cxn modelId="7" srcId="0" destId="3" srcOrd="2" destOrd="0"/>
+        <dgm:cxn modelId="8" srcId="0" destId="4" srcOrd="3" destOrd="0"/>
+      </dgm:cxnLst>
+      <dgm:bg/>
+      <dgm:whole/>
+    </dgm:dataModel>
+  </dgm:clrData>
+  <dgm:layoutNode name="Name0">
+    <dgm:varLst>
+      <dgm:dir/>
+      <dgm:resizeHandles val="exact"/>
+    </dgm:varLst>
+    <dgm:alg type="composite"/>
+    <dgm:shape xmlns:r="http://schemas.openxmlformats.org/officeDocument/2006/relationships" r:blip="">
+      <dgm:adjLst/>
+    </dgm:shape>
+    <dgm:presOf/>
+    <dgm:choose name="Name1">
+      <dgm:if name="Name2" func="var" arg="dir" op="equ" val="norm">
+        <dgm:constrLst>
+          <dgm:constr type="w" for="ch" forName="arrow" refType="w"/>
+          <dgm:constr type="h" for="ch" forName="arrow" refType="h" fact="0.4"/>
+          <dgm:constr type="ctrY" for="ch" forName="arrow" refType="h" fact="0.5"/>
+          <dgm:constr type="l" for="ch" forName="arrow"/>
+          <dgm:constr type="w" for="ch" forName="points" refType="w" fact="0.9"/>
+          <dgm:constr type="h" for="ch" forName="points" refType="h"/>
+          <dgm:constr type="t" for="ch" forName="points"/>
+          <dgm:constr type="l" for="ch" forName="points"/>
+        </dgm:constrLst>
+      </dgm:if>
+      <dgm:else name="Name3">
+        <dgm:constrLst>
+          <dgm:constr type="w" for="ch" forName="arrow" refType="w"/>
+          <dgm:constr type="h" for="ch" forName="arrow" refType="h" fact="0.4"/>
+          <dgm:constr type="ctrY" for="ch" forName="arrow" refType="h" fact="0.5"/>
+          <dgm:constr type="r" for="ch" forName="arrow" refType="w"/>
+          <dgm:constr type="w" for="ch" forName="points" refType="w" fact="0.9"/>
+          <dgm:constr type="h" for="ch" forName="points" refType="h"/>
+          <dgm:constr type="t" for="ch" forName="points"/>
+          <dgm:constr type="r" for="ch" forName="points" refType="w"/>
+        </dgm:constrLst>
+      </dgm:else>
+    </dgm:choose>
+    <dgm:ruleLst/>
+    <dgm:layoutNode name="arrow" styleLbl="bgShp">
+      <dgm:alg type="sp"/>
+      <dgm:choose name="Name4">
+        <dgm:if name="Name5" func="var" arg="dir" op="equ" val="norm">
+          <dgm:shape xmlns:r="http://schemas.openxmlformats.org/officeDocument/2006/relationships" type="notchedRightArrow" r:blip="">
+            <dgm:adjLst/>
+          </dgm:shape>
+        </dgm:if>
+        <dgm:else name="Name6">
+          <dgm:shape xmlns:r="http://schemas.openxmlformats.org/officeDocument/2006/relationships" rot="180" type="notchedRightArrow" r:blip="">
+            <dgm:adjLst/>
+          </dgm:shape>
+        </dgm:else>
+      </dgm:choose>
+      <dgm:presOf/>
+      <dgm:constrLst/>
+      <dgm:ruleLst/>
+    </dgm:layoutNode>
+    <dgm:layoutNode name="points">
+      <dgm:choose name="Name7">
+        <dgm:if name="Name8" func="var" arg="dir" op="equ" val="norm">
+          <dgm:alg type="lin">
+            <dgm:param type="linDir" val="fromL"/>
+          </dgm:alg>
+        </dgm:if>
+        <dgm:else name="Name9">
+          <dgm:alg type="lin">
+            <dgm:param type="linDir" val="fromR"/>
+          </dgm:alg>
+        </dgm:else>
+      </dgm:choose>
+      <dgm:shape xmlns:r="http://schemas.openxmlformats.org/officeDocument/2006/relationships" r:blip="">
+        <dgm:adjLst/>
+      </dgm:shape>
+      <dgm:presOf/>
+      <dgm:constrLst>
+        <dgm:constr type="w" for="ch" forName="compositeA" refType="w"/>
+        <dgm:constr type="h" for="ch" forName="compositeA" refType="h"/>
+        <dgm:constr type="w" for="ch" forName="compositeB" refType="w" refFor="ch" refForName="compositeA" op="equ"/>
+        <dgm:constr type="h" for="ch" forName="compositeB" refType="h" refFor="ch" refForName="compositeA" op="equ"/>
+        <dgm:constr type="primFontSz" for="des" ptType="node" op="equ" val="65"/>
+        <dgm:constr type="w" for="ch" forName="space" refType="w" refFor="ch" refForName="compositeA" op="equ" fact="0.05"/>
+      </dgm:constrLst>
+      <dgm:ruleLst/>
+      <dgm:forEach name="Name10" axis="ch" ptType="node">
+        <dgm:choose name="Name11">
+          <dgm:if name="Name12" axis="self" ptType="node" func="posOdd" op="equ" val="1">
+            <dgm:layoutNode name="compositeA">
+              <dgm:alg type="composite"/>
+              <dgm:shape xmlns:r="http://schemas.openxmlformats.org/officeDocument/2006/relationships" r:blip="">
+                <dgm:adjLst/>
+              </dgm:shape>
+              <dgm:presOf/>
+              <dgm:constrLst>
+                <dgm:constr type="w" for="ch" forName="textA" refType="w"/>
+                <dgm:constr type="h" for="ch" forName="textA" refType="h" fact="0.4"/>
+                <dgm:constr type="t" for="ch" forName="textA"/>
+                <dgm:constr type="l" for="ch" forName="textA"/>
+                <dgm:constr type="h" for="ch" forName="circleA" refType="h" fact="0.1"/>
+                <dgm:constr type="h" for="ch" forName="circleA" refType="w" op="lte"/>
+                <dgm:constr type="w" for="ch" forName="circleA" refType="h" refFor="ch" refForName="circleA" op="equ"/>
+                <dgm:constr type="ctrY" for="ch" forName="circleA" refType="h" fact="0.5"/>
+                <dgm:constr type="ctrX" for="ch" forName="circleA" refType="w" refFor="ch" refForName="textA" fact="0.5"/>
+                <dgm:constr type="w" for="ch" forName="spaceA" refType="w"/>
+                <dgm:constr type="h" for="ch" forName="spaceA" refType="h" fact="0.4"/>
+                <dgm:constr type="b" for="ch" forName="spaceA" refType="h"/>
+                <dgm:constr type="l" for="ch" forName="spaceA"/>
+              </dgm:constrLst>
+              <dgm:ruleLst/>
+              <dgm:layoutNode name="textA" styleLbl="revTx">
+                <dgm:varLst>
+                  <dgm:bulletEnabled val="1"/>
+                </dgm:varLst>
+                <dgm:alg type="tx">
+                  <dgm:param type="txAnchorVert" val="b"/>
+                  <dgm:param type="txAnchorVertCh" val="b"/>
+                  <dgm:param type="txAnchorHorzCh" val="ctr"/>
+                </dgm:alg>
+                <dgm:shape xmlns:r="http://schemas.openxmlformats.org/officeDocument/2006/relationships" type="rect" r:blip="">
+                  <dgm:adjLst/>
+                </dgm:shape>
+                <dgm:presOf axis="desOrSelf" ptType="node"/>
+                <dgm:constrLst/>
+                <dgm:ruleLst>
+                  <dgm:rule type="primFontSz" val="5" fact="NaN" max="NaN"/>
+                </dgm:ruleLst>
+              </dgm:layoutNode>
+              <dgm:layoutNode name="circleA">
+                <dgm:alg type="sp"/>
+                <dgm:shape xmlns:r="http://schemas.openxmlformats.org/officeDocument/2006/relationships" type="ellipse" r:blip="">
+                  <dgm:adjLst/>
+                </dgm:shape>
+                <dgm:presOf/>
+                <dgm:constrLst/>
+                <dgm:ruleLst/>
+              </dgm:layoutNode>
+              <dgm:layoutNode name="spaceA">
+                <dgm:alg type="sp"/>
+                <dgm:shape xmlns:r="http://schemas.openxmlformats.org/officeDocument/2006/relationships" r:blip="">
+                  <dgm:adjLst/>
+                </dgm:shape>
+                <dgm:presOf/>
+                <dgm:constrLst/>
+                <dgm:ruleLst/>
+              </dgm:layoutNode>
+            </dgm:layoutNode>
+          </dgm:if>
+          <dgm:else name="Name13">
+            <dgm:layoutNode name="compositeB">
+              <dgm:alg type="composite"/>
+              <dgm:shape xmlns:r="http://schemas.openxmlformats.org/officeDocument/2006/relationships" r:blip="">
+                <dgm:adjLst/>
+              </dgm:shape>
+              <dgm:presOf/>
+              <dgm:constrLst>
+                <dgm:constr type="w" for="ch" forName="textB" refType="w"/>
+                <dgm:constr type="h" for="ch" forName="textB" refType="h" fact="0.4"/>
+                <dgm:constr type="b" for="ch" forName="textB" refType="h"/>
+                <dgm:constr type="l" for="ch" forName="textB"/>
+                <dgm:constr type="h" for="ch" forName="circleB" refType="h" fact="0.1"/>
+                <dgm:constr type="w" for="ch" forName="circleB" refType="h" refFor="ch" refForName="circleB" op="equ"/>
+                <dgm:constr type="h" for="ch" forName="circleB" refType="w" op="lte"/>
+                <dgm:constr type="ctrY" for="ch" forName="circleB" refType="h" fact="0.5"/>
+                <dgm:constr type="ctrX" for="ch" forName="circleB" refType="w" refFor="ch" refForName="textB" fact="0.5"/>
+                <dgm:constr type="w" for="ch" forName="spaceB" refType="w"/>
+                <dgm:constr type="h" for="ch" forName="spaceB" refType="h" fact="0.4"/>
+                <dgm:constr type="t" for="ch" forName="spaceB"/>
+                <dgm:constr type="l" for="ch" forName="spaceB"/>
+              </dgm:constrLst>
+              <dgm:ruleLst/>
+              <dgm:layoutNode name="textB" styleLbl="revTx">
+                <dgm:varLst>
+                  <dgm:bulletEnabled val="1"/>
+                </dgm:varLst>
+                <dgm:alg type="tx">
+                  <dgm:param type="txAnchorVert" val="t"/>
+                  <dgm:param type="txAnchorVertCh" val="t"/>
+                  <dgm:param type="txAnchorHorzCh" val="ctr"/>
+                </dgm:alg>
+                <dgm:shape xmlns:r="http://schemas.openxmlformats.org/officeDocument/2006/relationships" type="rect" r:blip="">
+                  <dgm:adjLst/>
+                </dgm:shape>
+                <dgm:presOf axis="desOrSelf" ptType="node"/>
+                <dgm:constrLst/>
+                <dgm:ruleLst>
+                  <dgm:rule type="primFontSz" val="5" fact="NaN" max="NaN"/>
+                </dgm:ruleLst>
+              </dgm:layoutNode>
+              <dgm:layoutNode name="circleB">
+                <dgm:alg type="sp"/>
+                <dgm:shape xmlns:r="http://schemas.openxmlformats.org/officeDocument/2006/relationships" type="ellipse" r:blip="">
+                  <dgm:adjLst/>
+                </dgm:shape>
+                <dgm:presOf/>
+                <dgm:constrLst/>
+                <dgm:ruleLst/>
+              </dgm:layoutNode>
+              <dgm:layoutNode name="spaceB">
+                <dgm:alg type="sp"/>
+                <dgm:shape xmlns:r="http://schemas.openxmlformats.org/officeDocument/2006/relationships" r:blip="">
+                  <dgm:adjLst/>
+                </dgm:shape>
+                <dgm:presOf/>
+                <dgm:constrLst/>
+                <dgm:ruleLst/>
+              </dgm:layoutNode>
+            </dgm:layoutNode>
+          </dgm:else>
+        </dgm:choose>
+        <dgm:forEach name="Name14" axis="followSib" ptType="sibTrans" cnt="1">
+          <dgm:layoutNode name="space">
+            <dgm:alg type="sp"/>
+            <dgm:shape xmlns:r="http://schemas.openxmlformats.org/officeDocument/2006/relationships" r:blip="">
+              <dgm:adjLst/>
+            </dgm:shape>
+            <dgm:presOf/>
+            <dgm:constrLst/>
+            <dgm:ruleLst/>
+          </dgm:layoutNode>
+        </dgm:forEach>
+      </dgm:forEach>
+    </dgm:layoutNode>
+  </dgm:layoutNode>
+</dgm:layoutDef>
+</file>
+
 <file path=ppt/diagrams/quickStyle1.xml><?xml version="1.0" encoding="utf-8"?>
 <dgm:styleDef xmlns:dgm="http://schemas.openxmlformats.org/drawingml/2006/diagram" xmlns:a="http://schemas.openxmlformats.org/drawingml/2006/main" uniqueId="urn:microsoft.com/office/officeart/2005/8/quickstyle/simple1">
   <dgm:title val=""/>
@@ -5889,6 +7574,1040 @@
         <a:scrgbClr r="0" g="0" b="0"/>
       </a:fillRef>
       <a:effectRef idx="2">
+        <a:scrgbClr r="0" g="0" b="0"/>
+      </a:effectRef>
+      <a:fontRef idx="minor"/>
+    </dgm:style>
+  </dgm:styleLbl>
+  <dgm:styleLbl name="revTx">
+    <dgm:scene3d>
+      <a:camera prst="orthographicFront"/>
+      <a:lightRig rig="threePt" dir="t"/>
+    </dgm:scene3d>
+    <dgm:sp3d/>
+    <dgm:txPr/>
+    <dgm:style>
+      <a:lnRef idx="0">
+        <a:scrgbClr r="0" g="0" b="0"/>
+      </a:lnRef>
+      <a:fillRef idx="0">
+        <a:scrgbClr r="0" g="0" b="0"/>
+      </a:fillRef>
+      <a:effectRef idx="0">
+        <a:scrgbClr r="0" g="0" b="0"/>
+      </a:effectRef>
+      <a:fontRef idx="minor"/>
+    </dgm:style>
+  </dgm:styleLbl>
+</dgm:styleDef>
+</file>
+
+<file path=ppt/diagrams/quickStyle3.xml><?xml version="1.0" encoding="utf-8"?>
+<dgm:styleDef xmlns:dgm="http://schemas.openxmlformats.org/drawingml/2006/diagram" xmlns:a="http://schemas.openxmlformats.org/drawingml/2006/main" uniqueId="urn:microsoft.com/office/officeart/2005/8/quickstyle/simple1">
+  <dgm:title val=""/>
+  <dgm:desc val=""/>
+  <dgm:catLst>
+    <dgm:cat type="simple" pri="10100"/>
+  </dgm:catLst>
+  <dgm:scene3d>
+    <a:camera prst="orthographicFront"/>
+    <a:lightRig rig="threePt" dir="t"/>
+  </dgm:scene3d>
+  <dgm:styleLbl name="node0">
+    <dgm:scene3d>
+      <a:camera prst="orthographicFront"/>
+      <a:lightRig rig="threePt" dir="t"/>
+    </dgm:scene3d>
+    <dgm:sp3d/>
+    <dgm:txPr/>
+    <dgm:style>
+      <a:lnRef idx="2">
+        <a:scrgbClr r="0" g="0" b="0"/>
+      </a:lnRef>
+      <a:fillRef idx="1">
+        <a:scrgbClr r="0" g="0" b="0"/>
+      </a:fillRef>
+      <a:effectRef idx="0">
+        <a:scrgbClr r="0" g="0" b="0"/>
+      </a:effectRef>
+      <a:fontRef idx="minor">
+        <a:schemeClr val="lt1"/>
+      </a:fontRef>
+    </dgm:style>
+  </dgm:styleLbl>
+  <dgm:styleLbl name="lnNode1">
+    <dgm:scene3d>
+      <a:camera prst="orthographicFront"/>
+      <a:lightRig rig="threePt" dir="t"/>
+    </dgm:scene3d>
+    <dgm:sp3d/>
+    <dgm:txPr/>
+    <dgm:style>
+      <a:lnRef idx="2">
+        <a:scrgbClr r="0" g="0" b="0"/>
+      </a:lnRef>
+      <a:fillRef idx="1">
+        <a:scrgbClr r="0" g="0" b="0"/>
+      </a:fillRef>
+      <a:effectRef idx="0">
+        <a:scrgbClr r="0" g="0" b="0"/>
+      </a:effectRef>
+      <a:fontRef idx="minor">
+        <a:schemeClr val="lt1"/>
+      </a:fontRef>
+    </dgm:style>
+  </dgm:styleLbl>
+  <dgm:styleLbl name="vennNode1">
+    <dgm:scene3d>
+      <a:camera prst="orthographicFront"/>
+      <a:lightRig rig="threePt" dir="t"/>
+    </dgm:scene3d>
+    <dgm:sp3d/>
+    <dgm:txPr/>
+    <dgm:style>
+      <a:lnRef idx="2">
+        <a:scrgbClr r="0" g="0" b="0"/>
+      </a:lnRef>
+      <a:fillRef idx="1">
+        <a:scrgbClr r="0" g="0" b="0"/>
+      </a:fillRef>
+      <a:effectRef idx="0">
+        <a:scrgbClr r="0" g="0" b="0"/>
+      </a:effectRef>
+      <a:fontRef idx="minor">
+        <a:schemeClr val="tx1"/>
+      </a:fontRef>
+    </dgm:style>
+  </dgm:styleLbl>
+  <dgm:styleLbl name="alignNode1">
+    <dgm:scene3d>
+      <a:camera prst="orthographicFront"/>
+      <a:lightRig rig="threePt" dir="t"/>
+    </dgm:scene3d>
+    <dgm:sp3d/>
+    <dgm:txPr/>
+    <dgm:style>
+      <a:lnRef idx="2">
+        <a:scrgbClr r="0" g="0" b="0"/>
+      </a:lnRef>
+      <a:fillRef idx="1">
+        <a:scrgbClr r="0" g="0" b="0"/>
+      </a:fillRef>
+      <a:effectRef idx="0">
+        <a:scrgbClr r="0" g="0" b="0"/>
+      </a:effectRef>
+      <a:fontRef idx="minor">
+        <a:schemeClr val="lt1"/>
+      </a:fontRef>
+    </dgm:style>
+  </dgm:styleLbl>
+  <dgm:styleLbl name="node1">
+    <dgm:scene3d>
+      <a:camera prst="orthographicFront"/>
+      <a:lightRig rig="threePt" dir="t"/>
+    </dgm:scene3d>
+    <dgm:sp3d/>
+    <dgm:txPr/>
+    <dgm:style>
+      <a:lnRef idx="2">
+        <a:scrgbClr r="0" g="0" b="0"/>
+      </a:lnRef>
+      <a:fillRef idx="1">
+        <a:scrgbClr r="0" g="0" b="0"/>
+      </a:fillRef>
+      <a:effectRef idx="0">
+        <a:scrgbClr r="0" g="0" b="0"/>
+      </a:effectRef>
+      <a:fontRef idx="minor">
+        <a:schemeClr val="lt1"/>
+      </a:fontRef>
+    </dgm:style>
+  </dgm:styleLbl>
+  <dgm:styleLbl name="node2">
+    <dgm:scene3d>
+      <a:camera prst="orthographicFront"/>
+      <a:lightRig rig="threePt" dir="t"/>
+    </dgm:scene3d>
+    <dgm:sp3d/>
+    <dgm:txPr/>
+    <dgm:style>
+      <a:lnRef idx="2">
+        <a:scrgbClr r="0" g="0" b="0"/>
+      </a:lnRef>
+      <a:fillRef idx="1">
+        <a:scrgbClr r="0" g="0" b="0"/>
+      </a:fillRef>
+      <a:effectRef idx="0">
+        <a:scrgbClr r="0" g="0" b="0"/>
+      </a:effectRef>
+      <a:fontRef idx="minor">
+        <a:schemeClr val="lt1"/>
+      </a:fontRef>
+    </dgm:style>
+  </dgm:styleLbl>
+  <dgm:styleLbl name="node3">
+    <dgm:scene3d>
+      <a:camera prst="orthographicFront"/>
+      <a:lightRig rig="threePt" dir="t"/>
+    </dgm:scene3d>
+    <dgm:sp3d/>
+    <dgm:txPr/>
+    <dgm:style>
+      <a:lnRef idx="2">
+        <a:scrgbClr r="0" g="0" b="0"/>
+      </a:lnRef>
+      <a:fillRef idx="1">
+        <a:scrgbClr r="0" g="0" b="0"/>
+      </a:fillRef>
+      <a:effectRef idx="0">
+        <a:scrgbClr r="0" g="0" b="0"/>
+      </a:effectRef>
+      <a:fontRef idx="minor">
+        <a:schemeClr val="lt1"/>
+      </a:fontRef>
+    </dgm:style>
+  </dgm:styleLbl>
+  <dgm:styleLbl name="node4">
+    <dgm:scene3d>
+      <a:camera prst="orthographicFront"/>
+      <a:lightRig rig="threePt" dir="t"/>
+    </dgm:scene3d>
+    <dgm:sp3d/>
+    <dgm:txPr/>
+    <dgm:style>
+      <a:lnRef idx="2">
+        <a:scrgbClr r="0" g="0" b="0"/>
+      </a:lnRef>
+      <a:fillRef idx="1">
+        <a:scrgbClr r="0" g="0" b="0"/>
+      </a:fillRef>
+      <a:effectRef idx="0">
+        <a:scrgbClr r="0" g="0" b="0"/>
+      </a:effectRef>
+      <a:fontRef idx="minor">
+        <a:schemeClr val="lt1"/>
+      </a:fontRef>
+    </dgm:style>
+  </dgm:styleLbl>
+  <dgm:styleLbl name="fgImgPlace1">
+    <dgm:scene3d>
+      <a:camera prst="orthographicFront"/>
+      <a:lightRig rig="threePt" dir="t"/>
+    </dgm:scene3d>
+    <dgm:sp3d/>
+    <dgm:txPr/>
+    <dgm:style>
+      <a:lnRef idx="2">
+        <a:scrgbClr r="0" g="0" b="0"/>
+      </a:lnRef>
+      <a:fillRef idx="1">
+        <a:scrgbClr r="0" g="0" b="0"/>
+      </a:fillRef>
+      <a:effectRef idx="0">
+        <a:scrgbClr r="0" g="0" b="0"/>
+      </a:effectRef>
+      <a:fontRef idx="minor"/>
+    </dgm:style>
+  </dgm:styleLbl>
+  <dgm:styleLbl name="alignImgPlace1">
+    <dgm:scene3d>
+      <a:camera prst="orthographicFront"/>
+      <a:lightRig rig="threePt" dir="t"/>
+    </dgm:scene3d>
+    <dgm:sp3d/>
+    <dgm:txPr/>
+    <dgm:style>
+      <a:lnRef idx="2">
+        <a:scrgbClr r="0" g="0" b="0"/>
+      </a:lnRef>
+      <a:fillRef idx="1">
+        <a:scrgbClr r="0" g="0" b="0"/>
+      </a:fillRef>
+      <a:effectRef idx="0">
+        <a:scrgbClr r="0" g="0" b="0"/>
+      </a:effectRef>
+      <a:fontRef idx="minor"/>
+    </dgm:style>
+  </dgm:styleLbl>
+  <dgm:styleLbl name="bgImgPlace1">
+    <dgm:scene3d>
+      <a:camera prst="orthographicFront"/>
+      <a:lightRig rig="threePt" dir="t"/>
+    </dgm:scene3d>
+    <dgm:sp3d/>
+    <dgm:txPr/>
+    <dgm:style>
+      <a:lnRef idx="2">
+        <a:scrgbClr r="0" g="0" b="0"/>
+      </a:lnRef>
+      <a:fillRef idx="1">
+        <a:scrgbClr r="0" g="0" b="0"/>
+      </a:fillRef>
+      <a:effectRef idx="0">
+        <a:scrgbClr r="0" g="0" b="0"/>
+      </a:effectRef>
+      <a:fontRef idx="minor"/>
+    </dgm:style>
+  </dgm:styleLbl>
+  <dgm:styleLbl name="sibTrans2D1">
+    <dgm:scene3d>
+      <a:camera prst="orthographicFront"/>
+      <a:lightRig rig="threePt" dir="t"/>
+    </dgm:scene3d>
+    <dgm:sp3d/>
+    <dgm:txPr/>
+    <dgm:style>
+      <a:lnRef idx="0">
+        <a:scrgbClr r="0" g="0" b="0"/>
+      </a:lnRef>
+      <a:fillRef idx="1">
+        <a:scrgbClr r="0" g="0" b="0"/>
+      </a:fillRef>
+      <a:effectRef idx="0">
+        <a:scrgbClr r="0" g="0" b="0"/>
+      </a:effectRef>
+      <a:fontRef idx="minor">
+        <a:schemeClr val="lt1"/>
+      </a:fontRef>
+    </dgm:style>
+  </dgm:styleLbl>
+  <dgm:styleLbl name="fgSibTrans2D1">
+    <dgm:scene3d>
+      <a:camera prst="orthographicFront"/>
+      <a:lightRig rig="threePt" dir="t"/>
+    </dgm:scene3d>
+    <dgm:sp3d/>
+    <dgm:txPr/>
+    <dgm:style>
+      <a:lnRef idx="0">
+        <a:scrgbClr r="0" g="0" b="0"/>
+      </a:lnRef>
+      <a:fillRef idx="1">
+        <a:scrgbClr r="0" g="0" b="0"/>
+      </a:fillRef>
+      <a:effectRef idx="0">
+        <a:scrgbClr r="0" g="0" b="0"/>
+      </a:effectRef>
+      <a:fontRef idx="minor">
+        <a:schemeClr val="lt1"/>
+      </a:fontRef>
+    </dgm:style>
+  </dgm:styleLbl>
+  <dgm:styleLbl name="bgSibTrans2D1">
+    <dgm:scene3d>
+      <a:camera prst="orthographicFront"/>
+      <a:lightRig rig="threePt" dir="t"/>
+    </dgm:scene3d>
+    <dgm:sp3d/>
+    <dgm:txPr/>
+    <dgm:style>
+      <a:lnRef idx="0">
+        <a:scrgbClr r="0" g="0" b="0"/>
+      </a:lnRef>
+      <a:fillRef idx="1">
+        <a:scrgbClr r="0" g="0" b="0"/>
+      </a:fillRef>
+      <a:effectRef idx="0">
+        <a:scrgbClr r="0" g="0" b="0"/>
+      </a:effectRef>
+      <a:fontRef idx="minor">
+        <a:schemeClr val="lt1"/>
+      </a:fontRef>
+    </dgm:style>
+  </dgm:styleLbl>
+  <dgm:styleLbl name="sibTrans1D1">
+    <dgm:scene3d>
+      <a:camera prst="orthographicFront"/>
+      <a:lightRig rig="threePt" dir="t"/>
+    </dgm:scene3d>
+    <dgm:sp3d/>
+    <dgm:txPr/>
+    <dgm:style>
+      <a:lnRef idx="1">
+        <a:scrgbClr r="0" g="0" b="0"/>
+      </a:lnRef>
+      <a:fillRef idx="0">
+        <a:scrgbClr r="0" g="0" b="0"/>
+      </a:fillRef>
+      <a:effectRef idx="0">
+        <a:scrgbClr r="0" g="0" b="0"/>
+      </a:effectRef>
+      <a:fontRef idx="minor"/>
+    </dgm:style>
+  </dgm:styleLbl>
+  <dgm:styleLbl name="callout">
+    <dgm:scene3d>
+      <a:camera prst="orthographicFront"/>
+      <a:lightRig rig="threePt" dir="t"/>
+    </dgm:scene3d>
+    <dgm:sp3d/>
+    <dgm:txPr/>
+    <dgm:style>
+      <a:lnRef idx="2">
+        <a:scrgbClr r="0" g="0" b="0"/>
+      </a:lnRef>
+      <a:fillRef idx="1">
+        <a:scrgbClr r="0" g="0" b="0"/>
+      </a:fillRef>
+      <a:effectRef idx="0">
+        <a:scrgbClr r="0" g="0" b="0"/>
+      </a:effectRef>
+      <a:fontRef idx="minor"/>
+    </dgm:style>
+  </dgm:styleLbl>
+  <dgm:styleLbl name="asst0">
+    <dgm:scene3d>
+      <a:camera prst="orthographicFront"/>
+      <a:lightRig rig="threePt" dir="t"/>
+    </dgm:scene3d>
+    <dgm:sp3d/>
+    <dgm:txPr/>
+    <dgm:style>
+      <a:lnRef idx="2">
+        <a:scrgbClr r="0" g="0" b="0"/>
+      </a:lnRef>
+      <a:fillRef idx="1">
+        <a:scrgbClr r="0" g="0" b="0"/>
+      </a:fillRef>
+      <a:effectRef idx="0">
+        <a:scrgbClr r="0" g="0" b="0"/>
+      </a:effectRef>
+      <a:fontRef idx="minor">
+        <a:schemeClr val="lt1"/>
+      </a:fontRef>
+    </dgm:style>
+  </dgm:styleLbl>
+  <dgm:styleLbl name="asst1">
+    <dgm:scene3d>
+      <a:camera prst="orthographicFront"/>
+      <a:lightRig rig="threePt" dir="t"/>
+    </dgm:scene3d>
+    <dgm:sp3d/>
+    <dgm:txPr/>
+    <dgm:style>
+      <a:lnRef idx="2">
+        <a:scrgbClr r="0" g="0" b="0"/>
+      </a:lnRef>
+      <a:fillRef idx="1">
+        <a:scrgbClr r="0" g="0" b="0"/>
+      </a:fillRef>
+      <a:effectRef idx="0">
+        <a:scrgbClr r="0" g="0" b="0"/>
+      </a:effectRef>
+      <a:fontRef idx="minor">
+        <a:schemeClr val="lt1"/>
+      </a:fontRef>
+    </dgm:style>
+  </dgm:styleLbl>
+  <dgm:styleLbl name="asst2">
+    <dgm:scene3d>
+      <a:camera prst="orthographicFront"/>
+      <a:lightRig rig="threePt" dir="t"/>
+    </dgm:scene3d>
+    <dgm:sp3d/>
+    <dgm:txPr/>
+    <dgm:style>
+      <a:lnRef idx="2">
+        <a:scrgbClr r="0" g="0" b="0"/>
+      </a:lnRef>
+      <a:fillRef idx="1">
+        <a:scrgbClr r="0" g="0" b="0"/>
+      </a:fillRef>
+      <a:effectRef idx="0">
+        <a:scrgbClr r="0" g="0" b="0"/>
+      </a:effectRef>
+      <a:fontRef idx="minor">
+        <a:schemeClr val="lt1"/>
+      </a:fontRef>
+    </dgm:style>
+  </dgm:styleLbl>
+  <dgm:styleLbl name="asst3">
+    <dgm:scene3d>
+      <a:camera prst="orthographicFront"/>
+      <a:lightRig rig="threePt" dir="t"/>
+    </dgm:scene3d>
+    <dgm:sp3d/>
+    <dgm:txPr/>
+    <dgm:style>
+      <a:lnRef idx="2">
+        <a:scrgbClr r="0" g="0" b="0"/>
+      </a:lnRef>
+      <a:fillRef idx="1">
+        <a:scrgbClr r="0" g="0" b="0"/>
+      </a:fillRef>
+      <a:effectRef idx="0">
+        <a:scrgbClr r="0" g="0" b="0"/>
+      </a:effectRef>
+      <a:fontRef idx="minor">
+        <a:schemeClr val="lt1"/>
+      </a:fontRef>
+    </dgm:style>
+  </dgm:styleLbl>
+  <dgm:styleLbl name="asst4">
+    <dgm:scene3d>
+      <a:camera prst="orthographicFront"/>
+      <a:lightRig rig="threePt" dir="t"/>
+    </dgm:scene3d>
+    <dgm:sp3d/>
+    <dgm:txPr/>
+    <dgm:style>
+      <a:lnRef idx="2">
+        <a:scrgbClr r="0" g="0" b="0"/>
+      </a:lnRef>
+      <a:fillRef idx="1">
+        <a:scrgbClr r="0" g="0" b="0"/>
+      </a:fillRef>
+      <a:effectRef idx="0">
+        <a:scrgbClr r="0" g="0" b="0"/>
+      </a:effectRef>
+      <a:fontRef idx="minor">
+        <a:schemeClr val="lt1"/>
+      </a:fontRef>
+    </dgm:style>
+  </dgm:styleLbl>
+  <dgm:styleLbl name="parChTrans2D1">
+    <dgm:scene3d>
+      <a:camera prst="orthographicFront"/>
+      <a:lightRig rig="threePt" dir="t"/>
+    </dgm:scene3d>
+    <dgm:sp3d/>
+    <dgm:txPr/>
+    <dgm:style>
+      <a:lnRef idx="2">
+        <a:scrgbClr r="0" g="0" b="0"/>
+      </a:lnRef>
+      <a:fillRef idx="1">
+        <a:scrgbClr r="0" g="0" b="0"/>
+      </a:fillRef>
+      <a:effectRef idx="0">
+        <a:scrgbClr r="0" g="0" b="0"/>
+      </a:effectRef>
+      <a:fontRef idx="minor">
+        <a:schemeClr val="lt1"/>
+      </a:fontRef>
+    </dgm:style>
+  </dgm:styleLbl>
+  <dgm:styleLbl name="parChTrans2D2">
+    <dgm:scene3d>
+      <a:camera prst="orthographicFront"/>
+      <a:lightRig rig="threePt" dir="t"/>
+    </dgm:scene3d>
+    <dgm:sp3d/>
+    <dgm:txPr/>
+    <dgm:style>
+      <a:lnRef idx="2">
+        <a:scrgbClr r="0" g="0" b="0"/>
+      </a:lnRef>
+      <a:fillRef idx="1">
+        <a:scrgbClr r="0" g="0" b="0"/>
+      </a:fillRef>
+      <a:effectRef idx="0">
+        <a:scrgbClr r="0" g="0" b="0"/>
+      </a:effectRef>
+      <a:fontRef idx="minor">
+        <a:schemeClr val="lt1"/>
+      </a:fontRef>
+    </dgm:style>
+  </dgm:styleLbl>
+  <dgm:styleLbl name="parChTrans2D3">
+    <dgm:scene3d>
+      <a:camera prst="orthographicFront"/>
+      <a:lightRig rig="threePt" dir="t"/>
+    </dgm:scene3d>
+    <dgm:sp3d/>
+    <dgm:txPr/>
+    <dgm:style>
+      <a:lnRef idx="2">
+        <a:scrgbClr r="0" g="0" b="0"/>
+      </a:lnRef>
+      <a:fillRef idx="1">
+        <a:scrgbClr r="0" g="0" b="0"/>
+      </a:fillRef>
+      <a:effectRef idx="0">
+        <a:scrgbClr r="0" g="0" b="0"/>
+      </a:effectRef>
+      <a:fontRef idx="minor">
+        <a:schemeClr val="lt1"/>
+      </a:fontRef>
+    </dgm:style>
+  </dgm:styleLbl>
+  <dgm:styleLbl name="parChTrans2D4">
+    <dgm:scene3d>
+      <a:camera prst="orthographicFront"/>
+      <a:lightRig rig="threePt" dir="t"/>
+    </dgm:scene3d>
+    <dgm:sp3d/>
+    <dgm:txPr/>
+    <dgm:style>
+      <a:lnRef idx="2">
+        <a:scrgbClr r="0" g="0" b="0"/>
+      </a:lnRef>
+      <a:fillRef idx="1">
+        <a:scrgbClr r="0" g="0" b="0"/>
+      </a:fillRef>
+      <a:effectRef idx="0">
+        <a:scrgbClr r="0" g="0" b="0"/>
+      </a:effectRef>
+      <a:fontRef idx="minor">
+        <a:schemeClr val="lt1"/>
+      </a:fontRef>
+    </dgm:style>
+  </dgm:styleLbl>
+  <dgm:styleLbl name="parChTrans1D1">
+    <dgm:scene3d>
+      <a:camera prst="orthographicFront"/>
+      <a:lightRig rig="threePt" dir="t"/>
+    </dgm:scene3d>
+    <dgm:sp3d/>
+    <dgm:txPr/>
+    <dgm:style>
+      <a:lnRef idx="2">
+        <a:scrgbClr r="0" g="0" b="0"/>
+      </a:lnRef>
+      <a:fillRef idx="0">
+        <a:scrgbClr r="0" g="0" b="0"/>
+      </a:fillRef>
+      <a:effectRef idx="0">
+        <a:scrgbClr r="0" g="0" b="0"/>
+      </a:effectRef>
+      <a:fontRef idx="minor"/>
+    </dgm:style>
+  </dgm:styleLbl>
+  <dgm:styleLbl name="parChTrans1D2">
+    <dgm:scene3d>
+      <a:camera prst="orthographicFront"/>
+      <a:lightRig rig="threePt" dir="t"/>
+    </dgm:scene3d>
+    <dgm:sp3d/>
+    <dgm:txPr/>
+    <dgm:style>
+      <a:lnRef idx="2">
+        <a:scrgbClr r="0" g="0" b="0"/>
+      </a:lnRef>
+      <a:fillRef idx="0">
+        <a:scrgbClr r="0" g="0" b="0"/>
+      </a:fillRef>
+      <a:effectRef idx="0">
+        <a:scrgbClr r="0" g="0" b="0"/>
+      </a:effectRef>
+      <a:fontRef idx="minor"/>
+    </dgm:style>
+  </dgm:styleLbl>
+  <dgm:styleLbl name="parChTrans1D3">
+    <dgm:scene3d>
+      <a:camera prst="orthographicFront"/>
+      <a:lightRig rig="threePt" dir="t"/>
+    </dgm:scene3d>
+    <dgm:sp3d/>
+    <dgm:txPr/>
+    <dgm:style>
+      <a:lnRef idx="2">
+        <a:scrgbClr r="0" g="0" b="0"/>
+      </a:lnRef>
+      <a:fillRef idx="0">
+        <a:scrgbClr r="0" g="0" b="0"/>
+      </a:fillRef>
+      <a:effectRef idx="0">
+        <a:scrgbClr r="0" g="0" b="0"/>
+      </a:effectRef>
+      <a:fontRef idx="minor"/>
+    </dgm:style>
+  </dgm:styleLbl>
+  <dgm:styleLbl name="parChTrans1D4">
+    <dgm:scene3d>
+      <a:camera prst="orthographicFront"/>
+      <a:lightRig rig="threePt" dir="t"/>
+    </dgm:scene3d>
+    <dgm:sp3d/>
+    <dgm:txPr/>
+    <dgm:style>
+      <a:lnRef idx="2">
+        <a:scrgbClr r="0" g="0" b="0"/>
+      </a:lnRef>
+      <a:fillRef idx="0">
+        <a:scrgbClr r="0" g="0" b="0"/>
+      </a:fillRef>
+      <a:effectRef idx="0">
+        <a:scrgbClr r="0" g="0" b="0"/>
+      </a:effectRef>
+      <a:fontRef idx="minor"/>
+    </dgm:style>
+  </dgm:styleLbl>
+  <dgm:styleLbl name="fgAcc1">
+    <dgm:scene3d>
+      <a:camera prst="orthographicFront"/>
+      <a:lightRig rig="threePt" dir="t"/>
+    </dgm:scene3d>
+    <dgm:sp3d/>
+    <dgm:txPr/>
+    <dgm:style>
+      <a:lnRef idx="2">
+        <a:scrgbClr r="0" g="0" b="0"/>
+      </a:lnRef>
+      <a:fillRef idx="1">
+        <a:scrgbClr r="0" g="0" b="0"/>
+      </a:fillRef>
+      <a:effectRef idx="0">
+        <a:scrgbClr r="0" g="0" b="0"/>
+      </a:effectRef>
+      <a:fontRef idx="minor"/>
+    </dgm:style>
+  </dgm:styleLbl>
+  <dgm:styleLbl name="conFgAcc1">
+    <dgm:scene3d>
+      <a:camera prst="orthographicFront"/>
+      <a:lightRig rig="threePt" dir="t"/>
+    </dgm:scene3d>
+    <dgm:sp3d/>
+    <dgm:txPr/>
+    <dgm:style>
+      <a:lnRef idx="2">
+        <a:scrgbClr r="0" g="0" b="0"/>
+      </a:lnRef>
+      <a:fillRef idx="1">
+        <a:scrgbClr r="0" g="0" b="0"/>
+      </a:fillRef>
+      <a:effectRef idx="0">
+        <a:scrgbClr r="0" g="0" b="0"/>
+      </a:effectRef>
+      <a:fontRef idx="minor"/>
+    </dgm:style>
+  </dgm:styleLbl>
+  <dgm:styleLbl name="alignAcc1">
+    <dgm:scene3d>
+      <a:camera prst="orthographicFront"/>
+      <a:lightRig rig="threePt" dir="t"/>
+    </dgm:scene3d>
+    <dgm:sp3d/>
+    <dgm:txPr/>
+    <dgm:style>
+      <a:lnRef idx="2">
+        <a:scrgbClr r="0" g="0" b="0"/>
+      </a:lnRef>
+      <a:fillRef idx="1">
+        <a:scrgbClr r="0" g="0" b="0"/>
+      </a:fillRef>
+      <a:effectRef idx="0">
+        <a:scrgbClr r="0" g="0" b="0"/>
+      </a:effectRef>
+      <a:fontRef idx="minor"/>
+    </dgm:style>
+  </dgm:styleLbl>
+  <dgm:styleLbl name="trAlignAcc1">
+    <dgm:scene3d>
+      <a:camera prst="orthographicFront"/>
+      <a:lightRig rig="threePt" dir="t"/>
+    </dgm:scene3d>
+    <dgm:sp3d/>
+    <dgm:txPr/>
+    <dgm:style>
+      <a:lnRef idx="1">
+        <a:scrgbClr r="0" g="0" b="0"/>
+      </a:lnRef>
+      <a:fillRef idx="1">
+        <a:scrgbClr r="0" g="0" b="0"/>
+      </a:fillRef>
+      <a:effectRef idx="0">
+        <a:scrgbClr r="0" g="0" b="0"/>
+      </a:effectRef>
+      <a:fontRef idx="minor"/>
+    </dgm:style>
+  </dgm:styleLbl>
+  <dgm:styleLbl name="bgAcc1">
+    <dgm:scene3d>
+      <a:camera prst="orthographicFront"/>
+      <a:lightRig rig="threePt" dir="t"/>
+    </dgm:scene3d>
+    <dgm:sp3d/>
+    <dgm:txPr/>
+    <dgm:style>
+      <a:lnRef idx="2">
+        <a:scrgbClr r="0" g="0" b="0"/>
+      </a:lnRef>
+      <a:fillRef idx="1">
+        <a:scrgbClr r="0" g="0" b="0"/>
+      </a:fillRef>
+      <a:effectRef idx="0">
+        <a:scrgbClr r="0" g="0" b="0"/>
+      </a:effectRef>
+      <a:fontRef idx="minor"/>
+    </dgm:style>
+  </dgm:styleLbl>
+  <dgm:styleLbl name="solidFgAcc1">
+    <dgm:scene3d>
+      <a:camera prst="orthographicFront"/>
+      <a:lightRig rig="threePt" dir="t"/>
+    </dgm:scene3d>
+    <dgm:sp3d/>
+    <dgm:txPr/>
+    <dgm:style>
+      <a:lnRef idx="2">
+        <a:scrgbClr r="0" g="0" b="0"/>
+      </a:lnRef>
+      <a:fillRef idx="1">
+        <a:scrgbClr r="0" g="0" b="0"/>
+      </a:fillRef>
+      <a:effectRef idx="0">
+        <a:scrgbClr r="0" g="0" b="0"/>
+      </a:effectRef>
+      <a:fontRef idx="minor"/>
+    </dgm:style>
+  </dgm:styleLbl>
+  <dgm:styleLbl name="solidAlignAcc1">
+    <dgm:scene3d>
+      <a:camera prst="orthographicFront"/>
+      <a:lightRig rig="threePt" dir="t"/>
+    </dgm:scene3d>
+    <dgm:sp3d/>
+    <dgm:txPr/>
+    <dgm:style>
+      <a:lnRef idx="2">
+        <a:scrgbClr r="0" g="0" b="0"/>
+      </a:lnRef>
+      <a:fillRef idx="1">
+        <a:scrgbClr r="0" g="0" b="0"/>
+      </a:fillRef>
+      <a:effectRef idx="0">
+        <a:scrgbClr r="0" g="0" b="0"/>
+      </a:effectRef>
+      <a:fontRef idx="minor"/>
+    </dgm:style>
+  </dgm:styleLbl>
+  <dgm:styleLbl name="solidBgAcc1">
+    <dgm:scene3d>
+      <a:camera prst="orthographicFront"/>
+      <a:lightRig rig="threePt" dir="t"/>
+    </dgm:scene3d>
+    <dgm:sp3d/>
+    <dgm:txPr/>
+    <dgm:style>
+      <a:lnRef idx="2">
+        <a:scrgbClr r="0" g="0" b="0"/>
+      </a:lnRef>
+      <a:fillRef idx="1">
+        <a:scrgbClr r="0" g="0" b="0"/>
+      </a:fillRef>
+      <a:effectRef idx="0">
+        <a:scrgbClr r="0" g="0" b="0"/>
+      </a:effectRef>
+      <a:fontRef idx="minor"/>
+    </dgm:style>
+  </dgm:styleLbl>
+  <dgm:styleLbl name="fgAccFollowNode1">
+    <dgm:scene3d>
+      <a:camera prst="orthographicFront"/>
+      <a:lightRig rig="threePt" dir="t"/>
+    </dgm:scene3d>
+    <dgm:sp3d/>
+    <dgm:txPr/>
+    <dgm:style>
+      <a:lnRef idx="2">
+        <a:scrgbClr r="0" g="0" b="0"/>
+      </a:lnRef>
+      <a:fillRef idx="1">
+        <a:scrgbClr r="0" g="0" b="0"/>
+      </a:fillRef>
+      <a:effectRef idx="0">
+        <a:scrgbClr r="0" g="0" b="0"/>
+      </a:effectRef>
+      <a:fontRef idx="minor"/>
+    </dgm:style>
+  </dgm:styleLbl>
+  <dgm:styleLbl name="alignAccFollowNode1">
+    <dgm:scene3d>
+      <a:camera prst="orthographicFront"/>
+      <a:lightRig rig="threePt" dir="t"/>
+    </dgm:scene3d>
+    <dgm:sp3d/>
+    <dgm:txPr/>
+    <dgm:style>
+      <a:lnRef idx="2">
+        <a:scrgbClr r="0" g="0" b="0"/>
+      </a:lnRef>
+      <a:fillRef idx="1">
+        <a:scrgbClr r="0" g="0" b="0"/>
+      </a:fillRef>
+      <a:effectRef idx="0">
+        <a:scrgbClr r="0" g="0" b="0"/>
+      </a:effectRef>
+      <a:fontRef idx="minor"/>
+    </dgm:style>
+  </dgm:styleLbl>
+  <dgm:styleLbl name="bgAccFollowNode1">
+    <dgm:scene3d>
+      <a:camera prst="orthographicFront"/>
+      <a:lightRig rig="threePt" dir="t"/>
+    </dgm:scene3d>
+    <dgm:sp3d/>
+    <dgm:txPr/>
+    <dgm:style>
+      <a:lnRef idx="2">
+        <a:scrgbClr r="0" g="0" b="0"/>
+      </a:lnRef>
+      <a:fillRef idx="1">
+        <a:scrgbClr r="0" g="0" b="0"/>
+      </a:fillRef>
+      <a:effectRef idx="0">
+        <a:scrgbClr r="0" g="0" b="0"/>
+      </a:effectRef>
+      <a:fontRef idx="minor"/>
+    </dgm:style>
+  </dgm:styleLbl>
+  <dgm:styleLbl name="fgAcc0">
+    <dgm:scene3d>
+      <a:camera prst="orthographicFront"/>
+      <a:lightRig rig="threePt" dir="t"/>
+    </dgm:scene3d>
+    <dgm:sp3d/>
+    <dgm:txPr/>
+    <dgm:style>
+      <a:lnRef idx="2">
+        <a:scrgbClr r="0" g="0" b="0"/>
+      </a:lnRef>
+      <a:fillRef idx="1">
+        <a:scrgbClr r="0" g="0" b="0"/>
+      </a:fillRef>
+      <a:effectRef idx="0">
+        <a:scrgbClr r="0" g="0" b="0"/>
+      </a:effectRef>
+      <a:fontRef idx="minor"/>
+    </dgm:style>
+  </dgm:styleLbl>
+  <dgm:styleLbl name="fgAcc2">
+    <dgm:scene3d>
+      <a:camera prst="orthographicFront"/>
+      <a:lightRig rig="threePt" dir="t"/>
+    </dgm:scene3d>
+    <dgm:sp3d/>
+    <dgm:txPr/>
+    <dgm:style>
+      <a:lnRef idx="2">
+        <a:scrgbClr r="0" g="0" b="0"/>
+      </a:lnRef>
+      <a:fillRef idx="1">
+        <a:scrgbClr r="0" g="0" b="0"/>
+      </a:fillRef>
+      <a:effectRef idx="0">
+        <a:scrgbClr r="0" g="0" b="0"/>
+      </a:effectRef>
+      <a:fontRef idx="minor"/>
+    </dgm:style>
+  </dgm:styleLbl>
+  <dgm:styleLbl name="fgAcc3">
+    <dgm:scene3d>
+      <a:camera prst="orthographicFront"/>
+      <a:lightRig rig="threePt" dir="t"/>
+    </dgm:scene3d>
+    <dgm:sp3d/>
+    <dgm:txPr/>
+    <dgm:style>
+      <a:lnRef idx="2">
+        <a:scrgbClr r="0" g="0" b="0"/>
+      </a:lnRef>
+      <a:fillRef idx="1">
+        <a:scrgbClr r="0" g="0" b="0"/>
+      </a:fillRef>
+      <a:effectRef idx="0">
+        <a:scrgbClr r="0" g="0" b="0"/>
+      </a:effectRef>
+      <a:fontRef idx="minor"/>
+    </dgm:style>
+  </dgm:styleLbl>
+  <dgm:styleLbl name="fgAcc4">
+    <dgm:scene3d>
+      <a:camera prst="orthographicFront"/>
+      <a:lightRig rig="threePt" dir="t"/>
+    </dgm:scene3d>
+    <dgm:sp3d/>
+    <dgm:txPr/>
+    <dgm:style>
+      <a:lnRef idx="2">
+        <a:scrgbClr r="0" g="0" b="0"/>
+      </a:lnRef>
+      <a:fillRef idx="1">
+        <a:scrgbClr r="0" g="0" b="0"/>
+      </a:fillRef>
+      <a:effectRef idx="0">
+        <a:scrgbClr r="0" g="0" b="0"/>
+      </a:effectRef>
+      <a:fontRef idx="minor"/>
+    </dgm:style>
+  </dgm:styleLbl>
+  <dgm:styleLbl name="bgShp">
+    <dgm:scene3d>
+      <a:camera prst="orthographicFront"/>
+      <a:lightRig rig="threePt" dir="t"/>
+    </dgm:scene3d>
+    <dgm:sp3d/>
+    <dgm:txPr/>
+    <dgm:style>
+      <a:lnRef idx="0">
+        <a:scrgbClr r="0" g="0" b="0"/>
+      </a:lnRef>
+      <a:fillRef idx="1">
+        <a:scrgbClr r="0" g="0" b="0"/>
+      </a:fillRef>
+      <a:effectRef idx="0">
+        <a:scrgbClr r="0" g="0" b="0"/>
+      </a:effectRef>
+      <a:fontRef idx="minor"/>
+    </dgm:style>
+  </dgm:styleLbl>
+  <dgm:styleLbl name="dkBgShp">
+    <dgm:scene3d>
+      <a:camera prst="orthographicFront"/>
+      <a:lightRig rig="threePt" dir="t"/>
+    </dgm:scene3d>
+    <dgm:sp3d/>
+    <dgm:txPr/>
+    <dgm:style>
+      <a:lnRef idx="0">
+        <a:scrgbClr r="0" g="0" b="0"/>
+      </a:lnRef>
+      <a:fillRef idx="1">
+        <a:scrgbClr r="0" g="0" b="0"/>
+      </a:fillRef>
+      <a:effectRef idx="0">
+        <a:scrgbClr r="0" g="0" b="0"/>
+      </a:effectRef>
+      <a:fontRef idx="minor"/>
+    </dgm:style>
+  </dgm:styleLbl>
+  <dgm:styleLbl name="trBgShp">
+    <dgm:scene3d>
+      <a:camera prst="orthographicFront"/>
+      <a:lightRig rig="threePt" dir="t"/>
+    </dgm:scene3d>
+    <dgm:sp3d/>
+    <dgm:txPr/>
+    <dgm:style>
+      <a:lnRef idx="0">
+        <a:scrgbClr r="0" g="0" b="0"/>
+      </a:lnRef>
+      <a:fillRef idx="1">
+        <a:scrgbClr r="0" g="0" b="0"/>
+      </a:fillRef>
+      <a:effectRef idx="0">
+        <a:scrgbClr r="0" g="0" b="0"/>
+      </a:effectRef>
+      <a:fontRef idx="minor"/>
+    </dgm:style>
+  </dgm:styleLbl>
+  <dgm:styleLbl name="fgShp">
+    <dgm:scene3d>
+      <a:camera prst="orthographicFront"/>
+      <a:lightRig rig="threePt" dir="t"/>
+    </dgm:scene3d>
+    <dgm:sp3d/>
+    <dgm:txPr/>
+    <dgm:style>
+      <a:lnRef idx="2">
+        <a:scrgbClr r="0" g="0" b="0"/>
+      </a:lnRef>
+      <a:fillRef idx="1">
+        <a:scrgbClr r="0" g="0" b="0"/>
+      </a:fillRef>
+      <a:effectRef idx="0">
         <a:scrgbClr r="0" g="0" b="0"/>
       </a:effectRef>
       <a:fontRef idx="minor"/>
@@ -5999,7 +8718,7 @@
           <a:p>
             <a:fld id="{34475077-A074-4E8C-B45E-964494945228}" type="datetimeFigureOut">
               <a:rPr lang="en-US"/>
-              <a:t>4/12/2021</a:t>
+              <a:t>5/3/2021</a:t>
             </a:fld>
             <a:endParaRPr/>
           </a:p>
@@ -6164,7 +8883,7 @@
           <a:p>
             <a:fld id="{6A2B48A4-4B96-49F4-8C25-4C9D06114B2C}" type="datetimeFigureOut">
               <a:rPr lang="en-US"/>
-              <a:t>4/12/2021</a:t>
+              <a:t>5/3/2021</a:t>
             </a:fld>
             <a:endParaRPr/>
           </a:p>
@@ -6837,7 +9556,7 @@
           <a:p>
             <a:fld id="{0402902D-A5F5-4D7D-AAA7-32469BA0BC4D}" type="datetimeFigureOut">
               <a:rPr lang="en-US"/>
-              <a:t>4/12/2021</a:t>
+              <a:t>5/3/2021</a:t>
             </a:fld>
             <a:endParaRPr/>
           </a:p>
@@ -7108,7 +9827,7 @@
           <a:p>
             <a:fld id="{0402902D-A5F5-4D7D-AAA7-32469BA0BC4D}" type="datetimeFigureOut">
               <a:rPr lang="en-US"/>
-              <a:t>4/12/2021</a:t>
+              <a:t>5/3/2021</a:t>
             </a:fld>
             <a:endParaRPr/>
           </a:p>
@@ -7290,7 +10009,7 @@
           <a:p>
             <a:fld id="{0402902D-A5F5-4D7D-AAA7-32469BA0BC4D}" type="datetimeFigureOut">
               <a:rPr lang="en-US"/>
-              <a:t>4/12/2021</a:t>
+              <a:t>5/3/2021</a:t>
             </a:fld>
             <a:endParaRPr/>
           </a:p>
@@ -7877,7 +10596,7 @@
           <a:p>
             <a:fld id="{0402902D-A5F5-4D7D-AAA7-32469BA0BC4D}" type="datetimeFigureOut">
               <a:rPr lang="en-US"/>
-              <a:t>4/12/2021</a:t>
+              <a:t>5/3/2021</a:t>
             </a:fld>
             <a:endParaRPr/>
           </a:p>
@@ -8325,7 +11044,7 @@
           <a:p>
             <a:fld id="{0402902D-A5F5-4D7D-AAA7-32469BA0BC4D}" type="datetimeFigureOut">
               <a:rPr lang="en-US"/>
-              <a:t>4/12/2021</a:t>
+              <a:t>5/3/2021</a:t>
             </a:fld>
             <a:endParaRPr/>
           </a:p>
@@ -8455,7 +11174,7 @@
           <a:p>
             <a:fld id="{0402902D-A5F5-4D7D-AAA7-32469BA0BC4D}" type="datetimeFigureOut">
               <a:rPr lang="en-US"/>
-              <a:t>4/12/2021</a:t>
+              <a:t>5/3/2021</a:t>
             </a:fld>
             <a:endParaRPr/>
           </a:p>
@@ -8562,7 +11281,7 @@
           <a:p>
             <a:fld id="{0402902D-A5F5-4D7D-AAA7-32469BA0BC4D}" type="datetimeFigureOut">
               <a:rPr lang="en-US"/>
-              <a:t>4/12/2021</a:t>
+              <a:t>5/3/2021</a:t>
             </a:fld>
             <a:endParaRPr dirty="0"/>
           </a:p>
@@ -9534,7 +12253,7 @@
             <a:fld id="{0402902D-A5F5-4D7D-AAA7-32469BA0BC4D}" type="datetimeFigureOut">
               <a:rPr lang="en-US"/>
               <a:pPr/>
-              <a:t>4/12/2021</a:t>
+              <a:t>5/3/2021</a:t>
             </a:fld>
             <a:endParaRPr dirty="0"/>
           </a:p>
@@ -9909,6 +12628,219 @@
       </p:grpSpPr>
       <p:sp>
         <p:nvSpPr>
+          <p:cNvPr id="2" name="Title 1">
+            <a:extLst>
+              <a:ext uri="{FF2B5EF4-FFF2-40B4-BE49-F238E27FC236}">
+                <a16:creationId xmlns:a16="http://schemas.microsoft.com/office/drawing/2014/main" id="{748B6143-6267-4210-A5B3-37423AE99A23}"/>
+              </a:ext>
+            </a:extLst>
+          </p:cNvPr>
+          <p:cNvSpPr>
+            <a:spLocks noGrp="1"/>
+          </p:cNvSpPr>
+          <p:nvPr>
+            <p:ph type="title"/>
+          </p:nvPr>
+        </p:nvSpPr>
+        <p:spPr/>
+        <p:txBody>
+          <a:bodyPr/>
+          <a:lstStyle/>
+          <a:p>
+            <a:r>
+              <a:rPr kumimoji="0" lang="en-US" sz="3400" b="0" i="0" u="none" strike="noStrike" kern="1200" cap="none" spc="0" normalizeH="0" baseline="0" noProof="0" dirty="0">
+                <a:ln>
+                  <a:noFill/>
+                </a:ln>
+                <a:solidFill>
+                  <a:prstClr val="white"/>
+                </a:solidFill>
+                <a:effectLst/>
+                <a:uLnTx/>
+                <a:uFillTx/>
+                <a:latin typeface="Arial"/>
+                <a:ea typeface="+mj-ea"/>
+                <a:cs typeface="+mj-cs"/>
+              </a:rPr>
+              <a:t>Vehicle Model Identifier | </a:t>
+            </a:r>
+            <a:r>
+              <a:rPr kumimoji="0" lang="en-US" sz="1800" b="0" i="0" u="none" strike="noStrike" kern="1200" cap="none" spc="0" normalizeH="0" baseline="0" noProof="0" dirty="0">
+                <a:ln>
+                  <a:noFill/>
+                </a:ln>
+                <a:solidFill>
+                  <a:prstClr val="white"/>
+                </a:solidFill>
+                <a:effectLst/>
+                <a:uLnTx/>
+                <a:uFillTx/>
+                <a:latin typeface="Arial"/>
+                <a:ea typeface="+mj-ea"/>
+                <a:cs typeface="+mj-cs"/>
+              </a:rPr>
+              <a:t>R Noah Padilla </a:t>
+            </a:r>
+            <a:r>
+              <a:rPr kumimoji="0" lang="en-US" sz="3400" b="0" i="0" u="none" strike="noStrike" kern="1200" cap="none" spc="0" normalizeH="0" baseline="0" noProof="0" dirty="0">
+                <a:ln>
+                  <a:noFill/>
+                </a:ln>
+                <a:solidFill>
+                  <a:prstClr val="white"/>
+                </a:solidFill>
+                <a:effectLst/>
+                <a:uLnTx/>
+                <a:uFillTx/>
+                <a:latin typeface="Arial"/>
+                <a:ea typeface="+mj-ea"/>
+                <a:cs typeface="+mj-cs"/>
+              </a:rPr>
+              <a:t>|</a:t>
+            </a:r>
+            <a:r>
+              <a:rPr kumimoji="0" lang="en-US" sz="1800" b="0" i="0" u="none" strike="noStrike" kern="1200" cap="none" spc="0" normalizeH="0" baseline="0" noProof="0" dirty="0">
+                <a:ln>
+                  <a:noFill/>
+                </a:ln>
+                <a:solidFill>
+                  <a:prstClr val="white"/>
+                </a:solidFill>
+                <a:effectLst/>
+                <a:uLnTx/>
+                <a:uFillTx/>
+                <a:latin typeface="Arial"/>
+                <a:ea typeface="+mj-ea"/>
+                <a:cs typeface="+mj-cs"/>
+              </a:rPr>
+              <a:t> CV Final Project Proposal</a:t>
+            </a:r>
+            <a:endParaRPr lang="en-US" dirty="0"/>
+          </a:p>
+        </p:txBody>
+      </p:sp>
+      <p:pic>
+        <p:nvPicPr>
+          <p:cNvPr id="3" name="Picture 2">
+            <a:extLst>
+              <a:ext uri="{FF2B5EF4-FFF2-40B4-BE49-F238E27FC236}">
+                <a16:creationId xmlns:a16="http://schemas.microsoft.com/office/drawing/2014/main" id="{19261F66-9793-45C5-91E9-6BAE3AD60835}"/>
+              </a:ext>
+            </a:extLst>
+          </p:cNvPr>
+          <p:cNvPicPr>
+            <a:picLocks noChangeAspect="1"/>
+          </p:cNvPicPr>
+          <p:nvPr/>
+        </p:nvPicPr>
+        <p:blipFill>
+          <a:blip r:embed="rId2" cstate="print">
+            <a:extLst>
+              <a:ext uri="{28A0092B-C50C-407E-A947-70E740481C1C}">
+                <a14:useLocalDpi xmlns:a14="http://schemas.microsoft.com/office/drawing/2010/main" val="0"/>
+              </a:ext>
+              <a:ext uri="{837473B0-CC2E-450A-ABE3-18F120FF3D39}">
+                <a1611:picAttrSrcUrl xmlns:a1611="http://schemas.microsoft.com/office/drawing/2016/11/main" r:id="rId3"/>
+              </a:ext>
+            </a:extLst>
+          </a:blip>
+          <a:stretch>
+            <a:fillRect/>
+          </a:stretch>
+        </p:blipFill>
+        <p:spPr>
+          <a:xfrm>
+            <a:off x="2182729" y="2799148"/>
+            <a:ext cx="3035300" cy="1984802"/>
+          </a:xfrm>
+          <a:prstGeom prst="rect">
+            <a:avLst/>
+          </a:prstGeom>
+        </p:spPr>
+      </p:pic>
+      <p:pic>
+        <p:nvPicPr>
+          <p:cNvPr id="4" name="Picture 3">
+            <a:extLst>
+              <a:ext uri="{FF2B5EF4-FFF2-40B4-BE49-F238E27FC236}">
+                <a16:creationId xmlns:a16="http://schemas.microsoft.com/office/drawing/2014/main" id="{9F11BB69-36A9-4A89-9D30-C9535B33CC1E}"/>
+              </a:ext>
+            </a:extLst>
+          </p:cNvPr>
+          <p:cNvPicPr>
+            <a:picLocks noChangeAspect="1"/>
+          </p:cNvPicPr>
+          <p:nvPr/>
+        </p:nvPicPr>
+        <p:blipFill>
+          <a:blip r:embed="rId4" cstate="print">
+            <a:extLst>
+              <a:ext uri="{28A0092B-C50C-407E-A947-70E740481C1C}">
+                <a14:useLocalDpi xmlns:a14="http://schemas.microsoft.com/office/drawing/2010/main" val="0"/>
+              </a:ext>
+              <a:ext uri="{837473B0-CC2E-450A-ABE3-18F120FF3D39}">
+                <a1611:picAttrSrcUrl xmlns:a1611="http://schemas.microsoft.com/office/drawing/2016/11/main" r:id="rId5"/>
+              </a:ext>
+            </a:extLst>
+          </a:blip>
+          <a:stretch>
+            <a:fillRect/>
+          </a:stretch>
+        </p:blipFill>
+        <p:spPr>
+          <a:xfrm>
+            <a:off x="6670284" y="2799148"/>
+            <a:ext cx="3884628" cy="1984802"/>
+          </a:xfrm>
+          <a:prstGeom prst="rect">
+            <a:avLst/>
+          </a:prstGeom>
+        </p:spPr>
+      </p:pic>
+    </p:spTree>
+    <p:extLst>
+      <p:ext uri="{BB962C8B-B14F-4D97-AF65-F5344CB8AC3E}">
+        <p14:creationId xmlns:p14="http://schemas.microsoft.com/office/powerpoint/2010/main" val="1525949475"/>
+      </p:ext>
+    </p:extLst>
+  </p:cSld>
+  <p:clrMapOvr>
+    <a:masterClrMapping/>
+  </p:clrMapOvr>
+  <mc:AlternateContent xmlns:mc="http://schemas.openxmlformats.org/markup-compatibility/2006" xmlns:p14="http://schemas.microsoft.com/office/powerpoint/2010/main">
+    <mc:Choice Requires="p14">
+      <p:transition spd="med" p14:dur="700">
+        <p:fade/>
+      </p:transition>
+    </mc:Choice>
+    <mc:Fallback xmlns="">
+      <p:transition spd="med">
+        <p:fade/>
+      </p:transition>
+    </mc:Fallback>
+  </mc:AlternateContent>
+</p:sld>
+</file>
+
+<file path=ppt/slides/slide2.xml><?xml version="1.0" encoding="utf-8"?>
+<p:sld xmlns:a="http://schemas.openxmlformats.org/drawingml/2006/main" xmlns:r="http://schemas.openxmlformats.org/officeDocument/2006/relationships" xmlns:p="http://schemas.openxmlformats.org/presentationml/2006/main">
+  <p:cSld>
+    <p:spTree>
+      <p:nvGrpSpPr>
+        <p:cNvPr id="1" name=""/>
+        <p:cNvGrpSpPr/>
+        <p:nvPr/>
+      </p:nvGrpSpPr>
+      <p:grpSpPr>
+        <a:xfrm>
+          <a:off x="0" y="0"/>
+          <a:ext cx="0" cy="0"/>
+          <a:chOff x="0" y="0"/>
+          <a:chExt cx="0" cy="0"/>
+        </a:xfrm>
+      </p:grpSpPr>
+      <p:sp>
+        <p:nvSpPr>
           <p:cNvPr id="2" name="Title 1"/>
           <p:cNvSpPr>
             <a:spLocks noGrp="1"/>
@@ -10023,13 +12955,13 @@
           <p:nvPr>
             <p:extLst>
               <p:ext uri="{D42A27DB-BD31-4B8C-83A1-F6EECF244321}">
-                <p14:modId xmlns:p14="http://schemas.microsoft.com/office/powerpoint/2010/main" val="2949918779"/>
+                <p14:modId xmlns:p14="http://schemas.microsoft.com/office/powerpoint/2010/main" val="3052036478"/>
               </p:ext>
             </p:extLst>
           </p:nvPr>
         </p:nvGraphicFramePr>
         <p:xfrm>
-          <a:off x="842968" y="3846804"/>
+          <a:off x="146682" y="2313765"/>
           <a:ext cx="8195417" cy="3435409"/>
         </p:xfrm>
         <a:graphic>
@@ -10038,12 +12970,273 @@
           </a:graphicData>
         </a:graphic>
       </p:graphicFrame>
+    </p:spTree>
+    <p:extLst>
+      <p:ext uri="{BB962C8B-B14F-4D97-AF65-F5344CB8AC3E}">
+        <p14:creationId xmlns:p14="http://schemas.microsoft.com/office/powerpoint/2010/main" val="2349965430"/>
+      </p:ext>
+    </p:extLst>
+  </p:cSld>
+  <p:clrMapOvr>
+    <a:masterClrMapping/>
+  </p:clrMapOvr>
+  <mc:AlternateContent xmlns:mc="http://schemas.openxmlformats.org/markup-compatibility/2006" xmlns:p14="http://schemas.microsoft.com/office/powerpoint/2010/main">
+    <mc:Choice Requires="p14">
+      <p:transition spd="med" p14:dur="700">
+        <p:fade/>
+      </p:transition>
+    </mc:Choice>
+    <mc:Fallback xmlns="">
+      <p:transition spd="med">
+        <p:fade/>
+      </p:transition>
+    </mc:Fallback>
+  </mc:AlternateContent>
+</p:sld>
+</file>
+
+<file path=ppt/slides/slide3.xml><?xml version="1.0" encoding="utf-8"?>
+<p:sld xmlns:a="http://schemas.openxmlformats.org/drawingml/2006/main" xmlns:r="http://schemas.openxmlformats.org/officeDocument/2006/relationships" xmlns:p="http://schemas.openxmlformats.org/presentationml/2006/main">
+  <p:cSld>
+    <p:spTree>
+      <p:nvGrpSpPr>
+        <p:cNvPr id="1" name=""/>
+        <p:cNvGrpSpPr/>
+        <p:nvPr/>
+      </p:nvGrpSpPr>
+      <p:grpSpPr>
+        <a:xfrm>
+          <a:off x="0" y="0"/>
+          <a:ext cx="0" cy="0"/>
+          <a:chOff x="0" y="0"/>
+          <a:chExt cx="0" cy="0"/>
+        </a:xfrm>
+      </p:grpSpPr>
+      <p:sp>
+        <p:nvSpPr>
+          <p:cNvPr id="2" name="Title 1">
+            <a:extLst>
+              <a:ext uri="{FF2B5EF4-FFF2-40B4-BE49-F238E27FC236}">
+                <a16:creationId xmlns:a16="http://schemas.microsoft.com/office/drawing/2014/main" id="{D2291A1E-F7EE-4F48-9C48-950CDB91500F}"/>
+              </a:ext>
+            </a:extLst>
+          </p:cNvPr>
+          <p:cNvSpPr>
+            <a:spLocks noGrp="1"/>
+          </p:cNvSpPr>
+          <p:nvPr>
+            <p:ph type="title"/>
+          </p:nvPr>
+        </p:nvSpPr>
+        <p:spPr/>
+        <p:txBody>
+          <a:bodyPr/>
+          <a:lstStyle/>
+          <a:p>
+            <a:r>
+              <a:rPr lang="en-US" dirty="0"/>
+              <a:t>What I have done</a:t>
+            </a:r>
+          </a:p>
+        </p:txBody>
+      </p:sp>
+      <p:sp>
+        <p:nvSpPr>
+          <p:cNvPr id="3" name="Content Placeholder 2">
+            <a:extLst>
+              <a:ext uri="{FF2B5EF4-FFF2-40B4-BE49-F238E27FC236}">
+                <a16:creationId xmlns:a16="http://schemas.microsoft.com/office/drawing/2014/main" id="{05DBA496-4736-42B7-8F2B-09D1A5290D49}"/>
+              </a:ext>
+            </a:extLst>
+          </p:cNvPr>
+          <p:cNvSpPr>
+            <a:spLocks noGrp="1"/>
+          </p:cNvSpPr>
+          <p:nvPr>
+            <p:ph idx="1"/>
+          </p:nvPr>
+        </p:nvSpPr>
+        <p:spPr>
+          <a:xfrm>
+            <a:off x="116007" y="1961602"/>
+            <a:ext cx="12075993" cy="1995230"/>
+          </a:xfrm>
+        </p:spPr>
+        <p:txBody>
+          <a:bodyPr/>
+          <a:lstStyle/>
+          <a:p>
+            <a:r>
+              <a:rPr lang="en-US" dirty="0"/>
+              <a:t>Replaced RFC/MLP with </a:t>
+            </a:r>
+            <a:r>
+              <a:rPr lang="en-US" u="sng" dirty="0"/>
+              <a:t>K Means Clustering</a:t>
+            </a:r>
+            <a:r>
+              <a:rPr lang="en-US" dirty="0"/>
+              <a:t> with 2 clusters using HOG feature set </a:t>
+            </a:r>
+          </a:p>
+          <a:p>
+            <a:r>
+              <a:rPr lang="en-US" dirty="0"/>
+              <a:t>Finished clustering using a small set of training data (1/3 train images = 5398 images)</a:t>
+            </a:r>
+          </a:p>
+          <a:p>
+            <a:r>
+              <a:rPr lang="en-US" dirty="0"/>
+              <a:t>Tested the </a:t>
+            </a:r>
+            <a:r>
+              <a:rPr lang="en-US" dirty="0" err="1"/>
+              <a:t>Clustering+ORB+RANSAC</a:t>
+            </a:r>
+            <a:r>
+              <a:rPr lang="en-US" dirty="0"/>
+              <a:t> using 3 random test images </a:t>
+            </a:r>
+          </a:p>
+          <a:p>
+            <a:endParaRPr lang="en-US" dirty="0"/>
+          </a:p>
+        </p:txBody>
+      </p:sp>
+      <p:graphicFrame>
+        <p:nvGraphicFramePr>
+          <p:cNvPr id="4" name="Diagram 3">
+            <a:extLst>
+              <a:ext uri="{FF2B5EF4-FFF2-40B4-BE49-F238E27FC236}">
+                <a16:creationId xmlns:a16="http://schemas.microsoft.com/office/drawing/2014/main" id="{4303721F-3B3A-44E5-BAB9-BDF2B02E637B}"/>
+              </a:ext>
+            </a:extLst>
+          </p:cNvPr>
+          <p:cNvGraphicFramePr/>
+          <p:nvPr>
+            <p:extLst>
+              <p:ext uri="{D42A27DB-BD31-4B8C-83A1-F6EECF244321}">
+                <p14:modId xmlns:p14="http://schemas.microsoft.com/office/powerpoint/2010/main" val="3987045147"/>
+              </p:ext>
+            </p:extLst>
+          </p:nvPr>
+        </p:nvGraphicFramePr>
+        <p:xfrm>
+          <a:off x="0" y="4286774"/>
+          <a:ext cx="11903978" cy="2571226"/>
+        </p:xfrm>
+        <a:graphic>
+          <a:graphicData uri="http://schemas.openxmlformats.org/drawingml/2006/diagram">
+            <dgm:relIds xmlns:dgm="http://schemas.openxmlformats.org/drawingml/2006/diagram" xmlns:r="http://schemas.openxmlformats.org/officeDocument/2006/relationships" r:dm="rId2" r:lo="rId3" r:qs="rId4" r:cs="rId5"/>
+          </a:graphicData>
+        </a:graphic>
+      </p:graphicFrame>
+    </p:spTree>
+    <p:extLst>
+      <p:ext uri="{BB962C8B-B14F-4D97-AF65-F5344CB8AC3E}">
+        <p14:creationId xmlns:p14="http://schemas.microsoft.com/office/powerpoint/2010/main" val="2657776297"/>
+      </p:ext>
+    </p:extLst>
+  </p:cSld>
+  <p:clrMapOvr>
+    <a:masterClrMapping/>
+  </p:clrMapOvr>
+  <mc:AlternateContent xmlns:mc="http://schemas.openxmlformats.org/markup-compatibility/2006" xmlns:p14="http://schemas.microsoft.com/office/powerpoint/2010/main">
+    <mc:Choice Requires="p14">
+      <p:transition spd="med" p14:dur="700">
+        <p:fade/>
+      </p:transition>
+    </mc:Choice>
+    <mc:Fallback xmlns="">
+      <p:transition spd="med">
+        <p:fade/>
+      </p:transition>
+    </mc:Fallback>
+  </mc:AlternateContent>
+</p:sld>
+</file>
+
+<file path=ppt/slides/slide4.xml><?xml version="1.0" encoding="utf-8"?>
+<p:sld xmlns:a="http://schemas.openxmlformats.org/drawingml/2006/main" xmlns:r="http://schemas.openxmlformats.org/officeDocument/2006/relationships" xmlns:p="http://schemas.openxmlformats.org/presentationml/2006/main">
+  <p:cSld>
+    <p:spTree>
+      <p:nvGrpSpPr>
+        <p:cNvPr id="1" name=""/>
+        <p:cNvGrpSpPr/>
+        <p:nvPr/>
+      </p:nvGrpSpPr>
+      <p:grpSpPr>
+        <a:xfrm>
+          <a:off x="0" y="0"/>
+          <a:ext cx="0" cy="0"/>
+          <a:chOff x="0" y="0"/>
+          <a:chExt cx="0" cy="0"/>
+        </a:xfrm>
+      </p:grpSpPr>
+      <p:sp>
+        <p:nvSpPr>
+          <p:cNvPr id="2" name="Title 1">
+            <a:extLst>
+              <a:ext uri="{FF2B5EF4-FFF2-40B4-BE49-F238E27FC236}">
+                <a16:creationId xmlns:a16="http://schemas.microsoft.com/office/drawing/2014/main" id="{A3446541-7CA2-4DDB-AEBA-310E6D620AA6}"/>
+              </a:ext>
+            </a:extLst>
+          </p:cNvPr>
+          <p:cNvSpPr>
+            <a:spLocks noGrp="1"/>
+          </p:cNvSpPr>
+          <p:nvPr>
+            <p:ph type="title"/>
+          </p:nvPr>
+        </p:nvSpPr>
+        <p:spPr/>
+        <p:txBody>
+          <a:bodyPr/>
+          <a:lstStyle/>
+          <a:p>
+            <a:r>
+              <a:rPr lang="en-US" dirty="0"/>
+              <a:t>RESULT 1</a:t>
+            </a:r>
+          </a:p>
+        </p:txBody>
+      </p:sp>
       <p:pic>
         <p:nvPicPr>
-          <p:cNvPr id="13" name="Picture 12">
+          <p:cNvPr id="5" name="Content Placeholder 4">
             <a:extLst>
               <a:ext uri="{FF2B5EF4-FFF2-40B4-BE49-F238E27FC236}">
-                <a16:creationId xmlns:a16="http://schemas.microsoft.com/office/drawing/2014/main" id="{45EFCFE1-8D3A-4B11-853D-3D9301B5D948}"/>
+                <a16:creationId xmlns:a16="http://schemas.microsoft.com/office/drawing/2014/main" id="{12F2354D-7390-4CE9-9187-5CF5B27FB951}"/>
+              </a:ext>
+            </a:extLst>
+          </p:cNvPr>
+          <p:cNvPicPr>
+            <a:picLocks noGrp="1" noChangeAspect="1"/>
+          </p:cNvPicPr>
+          <p:nvPr>
+            <p:ph idx="1"/>
+          </p:nvPr>
+        </p:nvPicPr>
+        <p:blipFill>
+          <a:blip r:embed="rId2"/>
+          <a:stretch>
+            <a:fillRect/>
+          </a:stretch>
+        </p:blipFill>
+        <p:spPr>
+          <a:xfrm>
+            <a:off x="1959819" y="1789145"/>
+            <a:ext cx="2897930" cy="4457700"/>
+          </a:xfrm>
+        </p:spPr>
+      </p:pic>
+      <p:pic>
+        <p:nvPicPr>
+          <p:cNvPr id="7" name="Picture 6">
+            <a:extLst>
+              <a:ext uri="{FF2B5EF4-FFF2-40B4-BE49-F238E27FC236}">
+                <a16:creationId xmlns:a16="http://schemas.microsoft.com/office/drawing/2014/main" id="{129F12CF-330C-4AE1-AA2A-A994CB082CE7}"/>
               </a:ext>
             </a:extLst>
           </p:cNvPr>
@@ -10053,36 +13246,126 @@
           <p:nvPr/>
         </p:nvPicPr>
         <p:blipFill>
-          <a:blip r:embed="rId12" cstate="print">
-            <a:extLst>
-              <a:ext uri="{28A0092B-C50C-407E-A947-70E740481C1C}">
-                <a14:useLocalDpi xmlns:a14="http://schemas.microsoft.com/office/drawing/2010/main" val="0"/>
-              </a:ext>
-              <a:ext uri="{837473B0-CC2E-450A-ABE3-18F120FF3D39}">
-                <a1611:picAttrSrcUrl xmlns:a1611="http://schemas.microsoft.com/office/drawing/2016/11/main" r:id="rId13"/>
-              </a:ext>
-            </a:extLst>
-          </a:blip>
+          <a:blip r:embed="rId3"/>
           <a:stretch>
             <a:fillRect/>
           </a:stretch>
         </p:blipFill>
         <p:spPr>
           <a:xfrm>
-            <a:off x="471375" y="1750525"/>
-            <a:ext cx="3035300" cy="1984802"/>
+            <a:off x="5657308" y="2217241"/>
+            <a:ext cx="5841270" cy="2946032"/>
           </a:xfrm>
           <a:prstGeom prst="rect">
             <a:avLst/>
           </a:prstGeom>
         </p:spPr>
       </p:pic>
+    </p:spTree>
+    <p:extLst>
+      <p:ext uri="{BB962C8B-B14F-4D97-AF65-F5344CB8AC3E}">
+        <p14:creationId xmlns:p14="http://schemas.microsoft.com/office/powerpoint/2010/main" val="2689043206"/>
+      </p:ext>
+    </p:extLst>
+  </p:cSld>
+  <p:clrMapOvr>
+    <a:masterClrMapping/>
+  </p:clrMapOvr>
+  <mc:AlternateContent xmlns:mc="http://schemas.openxmlformats.org/markup-compatibility/2006" xmlns:p14="http://schemas.microsoft.com/office/powerpoint/2010/main">
+    <mc:Choice Requires="p14">
+      <p:transition spd="med" p14:dur="700">
+        <p:fade/>
+      </p:transition>
+    </mc:Choice>
+    <mc:Fallback xmlns="">
+      <p:transition spd="med">
+        <p:fade/>
+      </p:transition>
+    </mc:Fallback>
+  </mc:AlternateContent>
+</p:sld>
+</file>
+
+<file path=ppt/slides/slide5.xml><?xml version="1.0" encoding="utf-8"?>
+<p:sld xmlns:a="http://schemas.openxmlformats.org/drawingml/2006/main" xmlns:r="http://schemas.openxmlformats.org/officeDocument/2006/relationships" xmlns:p="http://schemas.openxmlformats.org/presentationml/2006/main">
+  <p:cSld>
+    <p:spTree>
+      <p:nvGrpSpPr>
+        <p:cNvPr id="1" name=""/>
+        <p:cNvGrpSpPr/>
+        <p:nvPr/>
+      </p:nvGrpSpPr>
+      <p:grpSpPr>
+        <a:xfrm>
+          <a:off x="0" y="0"/>
+          <a:ext cx="0" cy="0"/>
+          <a:chOff x="0" y="0"/>
+          <a:chExt cx="0" cy="0"/>
+        </a:xfrm>
+      </p:grpSpPr>
+      <p:sp>
+        <p:nvSpPr>
+          <p:cNvPr id="2" name="Title 1">
+            <a:extLst>
+              <a:ext uri="{FF2B5EF4-FFF2-40B4-BE49-F238E27FC236}">
+                <a16:creationId xmlns:a16="http://schemas.microsoft.com/office/drawing/2014/main" id="{49DED084-09B5-45B5-A2B4-70B6598FD2D1}"/>
+              </a:ext>
+            </a:extLst>
+          </p:cNvPr>
+          <p:cNvSpPr>
+            <a:spLocks noGrp="1"/>
+          </p:cNvSpPr>
+          <p:nvPr>
+            <p:ph type="title"/>
+          </p:nvPr>
+        </p:nvSpPr>
+        <p:spPr/>
+        <p:txBody>
+          <a:bodyPr/>
+          <a:lstStyle/>
+          <a:p>
+            <a:r>
+              <a:rPr lang="en-US" dirty="0"/>
+              <a:t>RESULT 2</a:t>
+            </a:r>
+          </a:p>
+        </p:txBody>
+      </p:sp>
       <p:pic>
         <p:nvPicPr>
-          <p:cNvPr id="14" name="Picture 13">
+          <p:cNvPr id="5" name="Content Placeholder 4">
             <a:extLst>
               <a:ext uri="{FF2B5EF4-FFF2-40B4-BE49-F238E27FC236}">
-                <a16:creationId xmlns:a16="http://schemas.microsoft.com/office/drawing/2014/main" id="{ACE9FE8E-45F9-47E9-A1EC-1A9560B2971B}"/>
+                <a16:creationId xmlns:a16="http://schemas.microsoft.com/office/drawing/2014/main" id="{1DD0E6B9-940C-4CFC-910D-C4F966876258}"/>
+              </a:ext>
+            </a:extLst>
+          </p:cNvPr>
+          <p:cNvPicPr>
+            <a:picLocks noGrp="1" noChangeAspect="1"/>
+          </p:cNvPicPr>
+          <p:nvPr>
+            <p:ph idx="1"/>
+          </p:nvPr>
+        </p:nvPicPr>
+        <p:blipFill>
+          <a:blip r:embed="rId2"/>
+          <a:stretch>
+            <a:fillRect/>
+          </a:stretch>
+        </p:blipFill>
+        <p:spPr>
+          <a:xfrm>
+            <a:off x="1263860" y="1901536"/>
+            <a:ext cx="2889407" cy="4457700"/>
+          </a:xfrm>
+        </p:spPr>
+      </p:pic>
+      <p:pic>
+        <p:nvPicPr>
+          <p:cNvPr id="7" name="Picture 6">
+            <a:extLst>
+              <a:ext uri="{FF2B5EF4-FFF2-40B4-BE49-F238E27FC236}">
+                <a16:creationId xmlns:a16="http://schemas.microsoft.com/office/drawing/2014/main" id="{D1745432-14B4-4AD9-AB74-19A059FA2C11}"/>
               </a:ext>
             </a:extLst>
           </p:cNvPr>
@@ -10092,24 +13375,15 @@
           <p:nvPr/>
         </p:nvPicPr>
         <p:blipFill>
-          <a:blip r:embed="rId14" cstate="print">
-            <a:extLst>
-              <a:ext uri="{28A0092B-C50C-407E-A947-70E740481C1C}">
-                <a14:useLocalDpi xmlns:a14="http://schemas.microsoft.com/office/drawing/2010/main" val="0"/>
-              </a:ext>
-              <a:ext uri="{837473B0-CC2E-450A-ABE3-18F120FF3D39}">
-                <a1611:picAttrSrcUrl xmlns:a1611="http://schemas.microsoft.com/office/drawing/2016/11/main" r:id="rId15"/>
-              </a:ext>
-            </a:extLst>
-          </a:blip>
+          <a:blip r:embed="rId3"/>
           <a:stretch>
             <a:fillRect/>
           </a:stretch>
         </p:blipFill>
         <p:spPr>
           <a:xfrm>
-            <a:off x="3725748" y="1749238"/>
-            <a:ext cx="3884628" cy="1984802"/>
+            <a:off x="5627619" y="2299457"/>
+            <a:ext cx="5841270" cy="2882540"/>
           </a:xfrm>
           <a:prstGeom prst="rect">
             <a:avLst/>
@@ -10119,7 +13393,358 @@
     </p:spTree>
     <p:extLst>
       <p:ext uri="{BB962C8B-B14F-4D97-AF65-F5344CB8AC3E}">
-        <p14:creationId xmlns:p14="http://schemas.microsoft.com/office/powerpoint/2010/main" val="2349965430"/>
+        <p14:creationId xmlns:p14="http://schemas.microsoft.com/office/powerpoint/2010/main" val="2606209815"/>
+      </p:ext>
+    </p:extLst>
+  </p:cSld>
+  <p:clrMapOvr>
+    <a:masterClrMapping/>
+  </p:clrMapOvr>
+  <mc:AlternateContent xmlns:mc="http://schemas.openxmlformats.org/markup-compatibility/2006" xmlns:p14="http://schemas.microsoft.com/office/powerpoint/2010/main">
+    <mc:Choice Requires="p14">
+      <p:transition spd="med" p14:dur="700">
+        <p:fade/>
+      </p:transition>
+    </mc:Choice>
+    <mc:Fallback xmlns="">
+      <p:transition spd="med">
+        <p:fade/>
+      </p:transition>
+    </mc:Fallback>
+  </mc:AlternateContent>
+</p:sld>
+</file>
+
+<file path=ppt/slides/slide6.xml><?xml version="1.0" encoding="utf-8"?>
+<p:sld xmlns:a="http://schemas.openxmlformats.org/drawingml/2006/main" xmlns:r="http://schemas.openxmlformats.org/officeDocument/2006/relationships" xmlns:p="http://schemas.openxmlformats.org/presentationml/2006/main">
+  <p:cSld>
+    <p:spTree>
+      <p:nvGrpSpPr>
+        <p:cNvPr id="1" name=""/>
+        <p:cNvGrpSpPr/>
+        <p:nvPr/>
+      </p:nvGrpSpPr>
+      <p:grpSpPr>
+        <a:xfrm>
+          <a:off x="0" y="0"/>
+          <a:ext cx="0" cy="0"/>
+          <a:chOff x="0" y="0"/>
+          <a:chExt cx="0" cy="0"/>
+        </a:xfrm>
+      </p:grpSpPr>
+      <p:sp>
+        <p:nvSpPr>
+          <p:cNvPr id="2" name="Title 1">
+            <a:extLst>
+              <a:ext uri="{FF2B5EF4-FFF2-40B4-BE49-F238E27FC236}">
+                <a16:creationId xmlns:a16="http://schemas.microsoft.com/office/drawing/2014/main" id="{84B15403-EC3A-4A36-A7DA-08556D4E8FCC}"/>
+              </a:ext>
+            </a:extLst>
+          </p:cNvPr>
+          <p:cNvSpPr>
+            <a:spLocks noGrp="1"/>
+          </p:cNvSpPr>
+          <p:nvPr>
+            <p:ph type="title"/>
+          </p:nvPr>
+        </p:nvSpPr>
+        <p:spPr/>
+        <p:txBody>
+          <a:bodyPr/>
+          <a:lstStyle/>
+          <a:p>
+            <a:r>
+              <a:rPr lang="en-US" dirty="0"/>
+              <a:t>RESULT 3</a:t>
+            </a:r>
+          </a:p>
+        </p:txBody>
+      </p:sp>
+      <p:pic>
+        <p:nvPicPr>
+          <p:cNvPr id="5" name="Content Placeholder 4">
+            <a:extLst>
+              <a:ext uri="{FF2B5EF4-FFF2-40B4-BE49-F238E27FC236}">
+                <a16:creationId xmlns:a16="http://schemas.microsoft.com/office/drawing/2014/main" id="{689AF3C7-7E44-4CA2-958F-90BF8C9E84E3}"/>
+              </a:ext>
+            </a:extLst>
+          </p:cNvPr>
+          <p:cNvPicPr>
+            <a:picLocks noGrp="1" noChangeAspect="1"/>
+          </p:cNvPicPr>
+          <p:nvPr>
+            <p:ph idx="1"/>
+          </p:nvPr>
+        </p:nvPicPr>
+        <p:blipFill>
+          <a:blip r:embed="rId2"/>
+          <a:stretch>
+            <a:fillRect/>
+          </a:stretch>
+        </p:blipFill>
+        <p:spPr>
+          <a:xfrm>
+            <a:off x="1413017" y="1714500"/>
+            <a:ext cx="2591091" cy="4457700"/>
+          </a:xfrm>
+        </p:spPr>
+      </p:pic>
+      <p:pic>
+        <p:nvPicPr>
+          <p:cNvPr id="7" name="Picture 6">
+            <a:extLst>
+              <a:ext uri="{FF2B5EF4-FFF2-40B4-BE49-F238E27FC236}">
+                <a16:creationId xmlns:a16="http://schemas.microsoft.com/office/drawing/2014/main" id="{C9658D6B-66BC-47EE-8303-4AC3BE48D98F}"/>
+              </a:ext>
+            </a:extLst>
+          </p:cNvPr>
+          <p:cNvPicPr>
+            <a:picLocks noChangeAspect="1"/>
+          </p:cNvPicPr>
+          <p:nvPr/>
+        </p:nvPicPr>
+        <p:blipFill>
+          <a:blip r:embed="rId3"/>
+          <a:stretch>
+            <a:fillRect/>
+          </a:stretch>
+        </p:blipFill>
+        <p:spPr>
+          <a:xfrm>
+            <a:off x="5267259" y="2451286"/>
+            <a:ext cx="5841270" cy="2984127"/>
+          </a:xfrm>
+          <a:prstGeom prst="rect">
+            <a:avLst/>
+          </a:prstGeom>
+        </p:spPr>
+      </p:pic>
+    </p:spTree>
+    <p:extLst>
+      <p:ext uri="{BB962C8B-B14F-4D97-AF65-F5344CB8AC3E}">
+        <p14:creationId xmlns:p14="http://schemas.microsoft.com/office/powerpoint/2010/main" val="2308500232"/>
+      </p:ext>
+    </p:extLst>
+  </p:cSld>
+  <p:clrMapOvr>
+    <a:masterClrMapping/>
+  </p:clrMapOvr>
+  <mc:AlternateContent xmlns:mc="http://schemas.openxmlformats.org/markup-compatibility/2006" xmlns:p14="http://schemas.microsoft.com/office/powerpoint/2010/main">
+    <mc:Choice Requires="p14">
+      <p:transition spd="med" p14:dur="700">
+        <p:fade/>
+      </p:transition>
+    </mc:Choice>
+    <mc:Fallback xmlns="">
+      <p:transition spd="med">
+        <p:fade/>
+      </p:transition>
+    </mc:Fallback>
+  </mc:AlternateContent>
+</p:sld>
+</file>
+
+<file path=ppt/slides/slide7.xml><?xml version="1.0" encoding="utf-8"?>
+<p:sld xmlns:a="http://schemas.openxmlformats.org/drawingml/2006/main" xmlns:r="http://schemas.openxmlformats.org/officeDocument/2006/relationships" xmlns:p="http://schemas.openxmlformats.org/presentationml/2006/main">
+  <p:cSld>
+    <p:spTree>
+      <p:nvGrpSpPr>
+        <p:cNvPr id="1" name=""/>
+        <p:cNvGrpSpPr/>
+        <p:nvPr/>
+      </p:nvGrpSpPr>
+      <p:grpSpPr>
+        <a:xfrm>
+          <a:off x="0" y="0"/>
+          <a:ext cx="0" cy="0"/>
+          <a:chOff x="0" y="0"/>
+          <a:chExt cx="0" cy="0"/>
+        </a:xfrm>
+      </p:grpSpPr>
+      <p:sp>
+        <p:nvSpPr>
+          <p:cNvPr id="2" name="Title 1">
+            <a:extLst>
+              <a:ext uri="{FF2B5EF4-FFF2-40B4-BE49-F238E27FC236}">
+                <a16:creationId xmlns:a16="http://schemas.microsoft.com/office/drawing/2014/main" id="{64B88AB4-1202-4AE1-A4B5-BDF66C230741}"/>
+              </a:ext>
+            </a:extLst>
+          </p:cNvPr>
+          <p:cNvSpPr>
+            <a:spLocks noGrp="1"/>
+          </p:cNvSpPr>
+          <p:nvPr>
+            <p:ph type="title"/>
+          </p:nvPr>
+        </p:nvSpPr>
+        <p:spPr/>
+        <p:txBody>
+          <a:bodyPr/>
+          <a:lstStyle/>
+          <a:p>
+            <a:r>
+              <a:rPr lang="en-US" dirty="0"/>
+              <a:t>TODO’s</a:t>
+            </a:r>
+          </a:p>
+        </p:txBody>
+      </p:sp>
+      <p:sp>
+        <p:nvSpPr>
+          <p:cNvPr id="3" name="Content Placeholder 2">
+            <a:extLst>
+              <a:ext uri="{FF2B5EF4-FFF2-40B4-BE49-F238E27FC236}">
+                <a16:creationId xmlns:a16="http://schemas.microsoft.com/office/drawing/2014/main" id="{CF503F0B-8F7A-41F9-82BF-3542F72A7D3B}"/>
+              </a:ext>
+            </a:extLst>
+          </p:cNvPr>
+          <p:cNvSpPr>
+            <a:spLocks noGrp="1"/>
+          </p:cNvSpPr>
+          <p:nvPr>
+            <p:ph idx="1"/>
+          </p:nvPr>
+        </p:nvSpPr>
+        <p:spPr/>
+        <p:txBody>
+          <a:bodyPr>
+            <a:normAutofit/>
+          </a:bodyPr>
+          <a:lstStyle/>
+          <a:p>
+            <a:r>
+              <a:rPr lang="en-US" b="1" u="sng" dirty="0"/>
+              <a:t>Time</a:t>
+            </a:r>
+            <a:r>
+              <a:rPr lang="en-US" dirty="0"/>
+              <a:t> how long my method takes</a:t>
+            </a:r>
+          </a:p>
+          <a:p>
+            <a:r>
+              <a:rPr lang="en-US" b="1" i="1" u="sng" dirty="0"/>
+              <a:t>*Time</a:t>
+            </a:r>
+            <a:r>
+              <a:rPr lang="en-US" i="1" dirty="0"/>
+              <a:t> a CNN approach and compare (might be on </a:t>
+            </a:r>
+            <a:r>
+              <a:rPr lang="en-US" i="1" dirty="0" err="1"/>
+              <a:t>kaggle</a:t>
+            </a:r>
+            <a:r>
+              <a:rPr lang="en-US" i="1" dirty="0"/>
+              <a:t> idk yet)</a:t>
+            </a:r>
+          </a:p>
+          <a:p>
+            <a:r>
+              <a:rPr lang="en-US" b="1" u="sng" dirty="0"/>
+              <a:t>Time</a:t>
+            </a:r>
+            <a:r>
+              <a:rPr lang="en-US" dirty="0"/>
+              <a:t> only ORB+RANSAC without </a:t>
+            </a:r>
+            <a:r>
+              <a:rPr lang="en-US"/>
+              <a:t>clustering approach and </a:t>
+            </a:r>
+            <a:r>
+              <a:rPr lang="en-US" dirty="0"/>
+              <a:t>compare</a:t>
+            </a:r>
+          </a:p>
+          <a:p>
+            <a:r>
+              <a:rPr lang="en-US" b="1" dirty="0">
+                <a:solidFill>
+                  <a:srgbClr val="FF0000"/>
+                </a:solidFill>
+              </a:rPr>
+              <a:t>Understand</a:t>
+            </a:r>
+            <a:r>
+              <a:rPr lang="en-US" dirty="0"/>
+              <a:t> and use the labeled data to notify user the make and model</a:t>
+            </a:r>
+          </a:p>
+          <a:p>
+            <a:r>
+              <a:rPr lang="en-US" dirty="0"/>
+              <a:t>Use </a:t>
+            </a:r>
+            <a:r>
+              <a:rPr lang="en-US" b="1" u="sng" dirty="0"/>
+              <a:t>more than 1/3 train data</a:t>
+            </a:r>
+            <a:r>
+              <a:rPr lang="en-US" dirty="0"/>
+              <a:t> when clustering</a:t>
+            </a:r>
+          </a:p>
+          <a:p>
+            <a:pPr marL="0" indent="0">
+              <a:buNone/>
+            </a:pPr>
+            <a:endParaRPr lang="en-US" dirty="0"/>
+          </a:p>
+          <a:p>
+            <a:pPr marL="0" indent="0">
+              <a:buNone/>
+            </a:pPr>
+            <a:r>
+              <a:rPr lang="en-US" dirty="0"/>
+              <a:t>Questions? </a:t>
+            </a:r>
+          </a:p>
+          <a:p>
+            <a:endParaRPr lang="en-US" dirty="0"/>
+          </a:p>
+          <a:p>
+            <a:pPr marL="0" indent="0">
+              <a:buNone/>
+            </a:pPr>
+            <a:endParaRPr lang="en-US" dirty="0"/>
+          </a:p>
+        </p:txBody>
+      </p:sp>
+      <p:pic>
+        <p:nvPicPr>
+          <p:cNvPr id="5" name="Picture 4">
+            <a:extLst>
+              <a:ext uri="{FF2B5EF4-FFF2-40B4-BE49-F238E27FC236}">
+                <a16:creationId xmlns:a16="http://schemas.microsoft.com/office/drawing/2014/main" id="{3F49EC77-093B-43DD-B6D8-B07AAAAF43AF}"/>
+              </a:ext>
+            </a:extLst>
+          </p:cNvPr>
+          <p:cNvPicPr>
+            <a:picLocks noChangeAspect="1"/>
+          </p:cNvPicPr>
+          <p:nvPr/>
+        </p:nvPicPr>
+        <p:blipFill>
+          <a:blip r:embed="rId2"/>
+          <a:stretch>
+            <a:fillRect/>
+          </a:stretch>
+        </p:blipFill>
+        <p:spPr>
+          <a:xfrm>
+            <a:off x="5317549" y="4806892"/>
+            <a:ext cx="2570800" cy="1924108"/>
+          </a:xfrm>
+          <a:prstGeom prst="rect">
+            <a:avLst/>
+          </a:prstGeom>
+        </p:spPr>
+      </p:pic>
+    </p:spTree>
+    <p:extLst>
+      <p:ext uri="{BB962C8B-B14F-4D97-AF65-F5344CB8AC3E}">
+        <p14:creationId xmlns:p14="http://schemas.microsoft.com/office/powerpoint/2010/main" val="1711446135"/>
       </p:ext>
     </p:extLst>
   </p:cSld>

</xml_diff>

<commit_message>
finished the project, uploaded the report and some results
</commit_message>
<xml_diff>
--- a/RNoahPadilla_FinalProjectProposal.pptx
+++ b/RNoahPadilla_FinalProjectProposal.pptx
@@ -13646,15 +13646,7 @@
             </a:r>
             <a:r>
               <a:rPr lang="en-US" dirty="0"/>
-              <a:t> only ORB+RANSAC without </a:t>
-            </a:r>
-            <a:r>
-              <a:rPr lang="en-US"/>
-              <a:t>clustering approach and </a:t>
-            </a:r>
-            <a:r>
-              <a:rPr lang="en-US" dirty="0"/>
-              <a:t>compare</a:t>
+              <a:t> only ORB+RANSAC without clustering approach and compare</a:t>
             </a:r>
           </a:p>
           <a:p>
@@ -13682,7 +13674,7 @@
             </a:r>
             <a:r>
               <a:rPr lang="en-US" dirty="0"/>
-              <a:t> when clustering</a:t>
+              <a:t> when clustering and test more</a:t>
             </a:r>
           </a:p>
           <a:p>
@@ -13707,7 +13699,7 @@
             <a:pPr marL="0" indent="0">
               <a:buNone/>
             </a:pPr>
-            <a:endParaRPr lang="en-US" dirty="0"/>
+            <a:endParaRPr lang="en-US" b="1" dirty="0"/>
           </a:p>
         </p:txBody>
       </p:sp>

</xml_diff>